<commit_message>
Minor updates to OOProg01 materials
Added a bit about auto-properties to ClassDefs PPT.
</commit_message>
<xml_diff>
--- a/Chap/OOProg01/Presentations/ClassDefinition.pptx
+++ b/Chap/OOProg01/Presentations/ClassDefinition.pptx
@@ -41,6 +41,12 @@
     <p:sldId id="362" r:id="rId35"/>
     <p:sldId id="363" r:id="rId36"/>
     <p:sldId id="364" r:id="rId37"/>
+    <p:sldId id="367" r:id="rId38"/>
+    <p:sldId id="368" r:id="rId39"/>
+    <p:sldId id="369" r:id="rId40"/>
+    <p:sldId id="372" r:id="rId41"/>
+    <p:sldId id="371" r:id="rId42"/>
+    <p:sldId id="370" r:id="rId43"/>
   </p:sldIdLst>
   <p:sldSz cx="12192000" cy="6858000"/>
   <p:notesSz cx="6858000" cy="9144000"/>
@@ -276,7 +282,7 @@
           <a:p>
             <a:fld id="{E15B7D8E-2A20-4C0E-991C-872DBB7459A8}" type="datetimeFigureOut">
               <a:rPr lang="da-DK" smtClean="0"/>
-              <a:t>11-08-2022</a:t>
+              <a:t>18-09-2022</a:t>
             </a:fld>
             <a:endParaRPr lang="da-DK"/>
           </a:p>
@@ -444,7 +450,7 @@
           <a:p>
             <a:fld id="{E15B7D8E-2A20-4C0E-991C-872DBB7459A8}" type="datetimeFigureOut">
               <a:rPr lang="da-DK" smtClean="0"/>
-              <a:t>11-08-2022</a:t>
+              <a:t>18-09-2022</a:t>
             </a:fld>
             <a:endParaRPr lang="da-DK"/>
           </a:p>
@@ -622,7 +628,7 @@
           <a:p>
             <a:fld id="{E15B7D8E-2A20-4C0E-991C-872DBB7459A8}" type="datetimeFigureOut">
               <a:rPr lang="da-DK" smtClean="0"/>
-              <a:t>11-08-2022</a:t>
+              <a:t>18-09-2022</a:t>
             </a:fld>
             <a:endParaRPr lang="da-DK"/>
           </a:p>
@@ -790,7 +796,7 @@
           <a:p>
             <a:fld id="{E15B7D8E-2A20-4C0E-991C-872DBB7459A8}" type="datetimeFigureOut">
               <a:rPr lang="da-DK" smtClean="0"/>
-              <a:t>11-08-2022</a:t>
+              <a:t>18-09-2022</a:t>
             </a:fld>
             <a:endParaRPr lang="da-DK"/>
           </a:p>
@@ -1035,7 +1041,7 @@
           <a:p>
             <a:fld id="{E15B7D8E-2A20-4C0E-991C-872DBB7459A8}" type="datetimeFigureOut">
               <a:rPr lang="da-DK" smtClean="0"/>
-              <a:t>11-08-2022</a:t>
+              <a:t>18-09-2022</a:t>
             </a:fld>
             <a:endParaRPr lang="da-DK"/>
           </a:p>
@@ -1264,7 +1270,7 @@
           <a:p>
             <a:fld id="{E15B7D8E-2A20-4C0E-991C-872DBB7459A8}" type="datetimeFigureOut">
               <a:rPr lang="da-DK" smtClean="0"/>
-              <a:t>11-08-2022</a:t>
+              <a:t>18-09-2022</a:t>
             </a:fld>
             <a:endParaRPr lang="da-DK"/>
           </a:p>
@@ -1628,7 +1634,7 @@
           <a:p>
             <a:fld id="{E15B7D8E-2A20-4C0E-991C-872DBB7459A8}" type="datetimeFigureOut">
               <a:rPr lang="da-DK" smtClean="0"/>
-              <a:t>11-08-2022</a:t>
+              <a:t>18-09-2022</a:t>
             </a:fld>
             <a:endParaRPr lang="da-DK"/>
           </a:p>
@@ -1745,7 +1751,7 @@
           <a:p>
             <a:fld id="{E15B7D8E-2A20-4C0E-991C-872DBB7459A8}" type="datetimeFigureOut">
               <a:rPr lang="da-DK" smtClean="0"/>
-              <a:t>11-08-2022</a:t>
+              <a:t>18-09-2022</a:t>
             </a:fld>
             <a:endParaRPr lang="da-DK"/>
           </a:p>
@@ -1840,7 +1846,7 @@
           <a:p>
             <a:fld id="{E15B7D8E-2A20-4C0E-991C-872DBB7459A8}" type="datetimeFigureOut">
               <a:rPr lang="da-DK" smtClean="0"/>
-              <a:t>11-08-2022</a:t>
+              <a:t>18-09-2022</a:t>
             </a:fld>
             <a:endParaRPr lang="da-DK"/>
           </a:p>
@@ -2115,7 +2121,7 @@
           <a:p>
             <a:fld id="{E15B7D8E-2A20-4C0E-991C-872DBB7459A8}" type="datetimeFigureOut">
               <a:rPr lang="da-DK" smtClean="0"/>
-              <a:t>11-08-2022</a:t>
+              <a:t>18-09-2022</a:t>
             </a:fld>
             <a:endParaRPr lang="da-DK"/>
           </a:p>
@@ -2367,7 +2373,7 @@
           <a:p>
             <a:fld id="{E15B7D8E-2A20-4C0E-991C-872DBB7459A8}" type="datetimeFigureOut">
               <a:rPr lang="da-DK" smtClean="0"/>
-              <a:t>11-08-2022</a:t>
+              <a:t>18-09-2022</a:t>
             </a:fld>
             <a:endParaRPr lang="da-DK"/>
           </a:p>
@@ -2578,7 +2584,7 @@
           <a:p>
             <a:fld id="{E15B7D8E-2A20-4C0E-991C-872DBB7459A8}" type="datetimeFigureOut">
               <a:rPr lang="da-DK" smtClean="0"/>
-              <a:t>11-08-2022</a:t>
+              <a:t>18-09-2022</a:t>
             </a:fld>
             <a:endParaRPr lang="da-DK"/>
           </a:p>
@@ -3175,6 +3181,18 @@
   <p:clrMapOvr>
     <a:masterClrMapping/>
   </p:clrMapOvr>
+  <mc:AlternateContent xmlns:mc="http://schemas.openxmlformats.org/markup-compatibility/2006">
+    <mc:Choice xmlns:p14="http://schemas.microsoft.com/office/powerpoint/2010/main" Requires="p14">
+      <p:transition spd="med" p14:dur="700">
+        <p:fade/>
+      </p:transition>
+    </mc:Choice>
+    <mc:Fallback>
+      <p:transition spd="med">
+        <p:fade/>
+      </p:transition>
+    </mc:Fallback>
+  </mc:AlternateContent>
 </p:sld>
 </file>
 
@@ -3261,6 +3279,18 @@
   <p:clrMapOvr>
     <a:masterClrMapping/>
   </p:clrMapOvr>
+  <mc:AlternateContent xmlns:mc="http://schemas.openxmlformats.org/markup-compatibility/2006">
+    <mc:Choice xmlns:p14="http://schemas.microsoft.com/office/powerpoint/2010/main" Requires="p14">
+      <p:transition spd="med" p14:dur="700">
+        <p:fade/>
+      </p:transition>
+    </mc:Choice>
+    <mc:Fallback>
+      <p:transition spd="med">
+        <p:fade/>
+      </p:transition>
+    </mc:Fallback>
+  </mc:AlternateContent>
 </p:sld>
 </file>
 
@@ -3378,6 +3408,18 @@
   <p:clrMapOvr>
     <a:masterClrMapping/>
   </p:clrMapOvr>
+  <mc:AlternateContent xmlns:mc="http://schemas.openxmlformats.org/markup-compatibility/2006">
+    <mc:Choice xmlns:p14="http://schemas.microsoft.com/office/powerpoint/2010/main" Requires="p14">
+      <p:transition spd="med" p14:dur="700">
+        <p:fade/>
+      </p:transition>
+    </mc:Choice>
+    <mc:Fallback>
+      <p:transition spd="med">
+        <p:fade/>
+      </p:transition>
+    </mc:Fallback>
+  </mc:AlternateContent>
 </p:sld>
 </file>
 
@@ -3556,6 +3598,18 @@
   <p:clrMapOvr>
     <a:masterClrMapping/>
   </p:clrMapOvr>
+  <mc:AlternateContent xmlns:mc="http://schemas.openxmlformats.org/markup-compatibility/2006">
+    <mc:Choice xmlns:p14="http://schemas.microsoft.com/office/powerpoint/2010/main" Requires="p14">
+      <p:transition spd="med" p14:dur="700">
+        <p:fade/>
+      </p:transition>
+    </mc:Choice>
+    <mc:Fallback>
+      <p:transition spd="med">
+        <p:fade/>
+      </p:transition>
+    </mc:Fallback>
+  </mc:AlternateContent>
 </p:sld>
 </file>
 
@@ -3665,6 +3719,18 @@
   <p:clrMapOvr>
     <a:masterClrMapping/>
   </p:clrMapOvr>
+  <mc:AlternateContent xmlns:mc="http://schemas.openxmlformats.org/markup-compatibility/2006">
+    <mc:Choice xmlns:p14="http://schemas.microsoft.com/office/powerpoint/2010/main" Requires="p14">
+      <p:transition spd="med" p14:dur="700">
+        <p:fade/>
+      </p:transition>
+    </mc:Choice>
+    <mc:Fallback>
+      <p:transition spd="med">
+        <p:fade/>
+      </p:transition>
+    </mc:Fallback>
+  </mc:AlternateContent>
 </p:sld>
 </file>
 
@@ -3827,6 +3893,18 @@
   <p:clrMapOvr>
     <a:masterClrMapping/>
   </p:clrMapOvr>
+  <mc:AlternateContent xmlns:mc="http://schemas.openxmlformats.org/markup-compatibility/2006">
+    <mc:Choice xmlns:p14="http://schemas.microsoft.com/office/powerpoint/2010/main" Requires="p14">
+      <p:transition spd="med" p14:dur="700">
+        <p:fade/>
+      </p:transition>
+    </mc:Choice>
+    <mc:Fallback>
+      <p:transition spd="med">
+        <p:fade/>
+      </p:transition>
+    </mc:Fallback>
+  </mc:AlternateContent>
 </p:sld>
 </file>
 
@@ -4109,6 +4187,18 @@
   <p:clrMapOvr>
     <a:masterClrMapping/>
   </p:clrMapOvr>
+  <mc:AlternateContent xmlns:mc="http://schemas.openxmlformats.org/markup-compatibility/2006">
+    <mc:Choice xmlns:p14="http://schemas.microsoft.com/office/powerpoint/2010/main" Requires="p14">
+      <p:transition spd="med" p14:dur="700">
+        <p:fade/>
+      </p:transition>
+    </mc:Choice>
+    <mc:Fallback>
+      <p:transition spd="med">
+        <p:fade/>
+      </p:transition>
+    </mc:Fallback>
+  </mc:AlternateContent>
 </p:sld>
 </file>
 
@@ -4382,6 +4472,18 @@
   <p:clrMapOvr>
     <a:masterClrMapping/>
   </p:clrMapOvr>
+  <mc:AlternateContent xmlns:mc="http://schemas.openxmlformats.org/markup-compatibility/2006">
+    <mc:Choice xmlns:p14="http://schemas.microsoft.com/office/powerpoint/2010/main" Requires="p14">
+      <p:transition spd="med" p14:dur="700">
+        <p:fade/>
+      </p:transition>
+    </mc:Choice>
+    <mc:Fallback>
+      <p:transition spd="med">
+        <p:fade/>
+      </p:transition>
+    </mc:Fallback>
+  </mc:AlternateContent>
 </p:sld>
 </file>
 
@@ -4506,6 +4608,18 @@
   <p:clrMapOvr>
     <a:masterClrMapping/>
   </p:clrMapOvr>
+  <mc:AlternateContent xmlns:mc="http://schemas.openxmlformats.org/markup-compatibility/2006">
+    <mc:Choice xmlns:p14="http://schemas.microsoft.com/office/powerpoint/2010/main" Requires="p14">
+      <p:transition spd="med" p14:dur="700">
+        <p:fade/>
+      </p:transition>
+    </mc:Choice>
+    <mc:Fallback>
+      <p:transition spd="med">
+        <p:fade/>
+      </p:transition>
+    </mc:Fallback>
+  </mc:AlternateContent>
 </p:sld>
 </file>
 
@@ -4668,6 +4782,18 @@
   <p:clrMapOvr>
     <a:masterClrMapping/>
   </p:clrMapOvr>
+  <mc:AlternateContent xmlns:mc="http://schemas.openxmlformats.org/markup-compatibility/2006">
+    <mc:Choice xmlns:p14="http://schemas.microsoft.com/office/powerpoint/2010/main" Requires="p14">
+      <p:transition spd="med" p14:dur="700">
+        <p:fade/>
+      </p:transition>
+    </mc:Choice>
+    <mc:Fallback>
+      <p:transition spd="med">
+        <p:fade/>
+      </p:transition>
+    </mc:Fallback>
+  </mc:AlternateContent>
 </p:sld>
 </file>
 
@@ -4806,6 +4932,18 @@
   <p:clrMapOvr>
     <a:masterClrMapping/>
   </p:clrMapOvr>
+  <mc:AlternateContent xmlns:mc="http://schemas.openxmlformats.org/markup-compatibility/2006">
+    <mc:Choice xmlns:p14="http://schemas.microsoft.com/office/powerpoint/2010/main" Requires="p14">
+      <p:transition spd="med" p14:dur="700">
+        <p:fade/>
+      </p:transition>
+    </mc:Choice>
+    <mc:Fallback>
+      <p:transition spd="med">
+        <p:fade/>
+      </p:transition>
+    </mc:Fallback>
+  </mc:AlternateContent>
 </p:sld>
 </file>
 
@@ -5182,6 +5320,18 @@
   <p:clrMapOvr>
     <a:masterClrMapping/>
   </p:clrMapOvr>
+  <mc:AlternateContent xmlns:mc="http://schemas.openxmlformats.org/markup-compatibility/2006">
+    <mc:Choice xmlns:p14="http://schemas.microsoft.com/office/powerpoint/2010/main" Requires="p14">
+      <p:transition spd="med" p14:dur="700">
+        <p:fade/>
+      </p:transition>
+    </mc:Choice>
+    <mc:Fallback>
+      <p:transition spd="med">
+        <p:fade/>
+      </p:transition>
+    </mc:Fallback>
+  </mc:AlternateContent>
 </p:sld>
 </file>
 
@@ -5318,6 +5468,18 @@
   <p:clrMapOvr>
     <a:masterClrMapping/>
   </p:clrMapOvr>
+  <mc:AlternateContent xmlns:mc="http://schemas.openxmlformats.org/markup-compatibility/2006">
+    <mc:Choice xmlns:p14="http://schemas.microsoft.com/office/powerpoint/2010/main" Requires="p14">
+      <p:transition spd="med" p14:dur="700">
+        <p:fade/>
+      </p:transition>
+    </mc:Choice>
+    <mc:Fallback>
+      <p:transition spd="med">
+        <p:fade/>
+      </p:transition>
+    </mc:Fallback>
+  </mc:AlternateContent>
 </p:sld>
 </file>
 
@@ -5544,6 +5706,18 @@
   <p:clrMapOvr>
     <a:masterClrMapping/>
   </p:clrMapOvr>
+  <mc:AlternateContent xmlns:mc="http://schemas.openxmlformats.org/markup-compatibility/2006">
+    <mc:Choice xmlns:p14="http://schemas.microsoft.com/office/powerpoint/2010/main" Requires="p14">
+      <p:transition spd="med" p14:dur="700">
+        <p:fade/>
+      </p:transition>
+    </mc:Choice>
+    <mc:Fallback>
+      <p:transition spd="med">
+        <p:fade/>
+      </p:transition>
+    </mc:Fallback>
+  </mc:AlternateContent>
 </p:sld>
 </file>
 
@@ -5849,6 +6023,18 @@
   <p:clrMapOvr>
     <a:masterClrMapping/>
   </p:clrMapOvr>
+  <mc:AlternateContent xmlns:mc="http://schemas.openxmlformats.org/markup-compatibility/2006">
+    <mc:Choice xmlns:p14="http://schemas.microsoft.com/office/powerpoint/2010/main" Requires="p14">
+      <p:transition spd="med" p14:dur="700">
+        <p:fade/>
+      </p:transition>
+    </mc:Choice>
+    <mc:Fallback>
+      <p:transition spd="med">
+        <p:fade/>
+      </p:transition>
+    </mc:Fallback>
+  </mc:AlternateContent>
 </p:sld>
 </file>
 
@@ -6162,6 +6348,18 @@
   <p:clrMapOvr>
     <a:masterClrMapping/>
   </p:clrMapOvr>
+  <mc:AlternateContent xmlns:mc="http://schemas.openxmlformats.org/markup-compatibility/2006">
+    <mc:Choice xmlns:p14="http://schemas.microsoft.com/office/powerpoint/2010/main" Requires="p14">
+      <p:transition spd="med" p14:dur="700">
+        <p:fade/>
+      </p:transition>
+    </mc:Choice>
+    <mc:Fallback>
+      <p:transition spd="med">
+        <p:fade/>
+      </p:transition>
+    </mc:Fallback>
+  </mc:AlternateContent>
 </p:sld>
 </file>
 
@@ -6467,6 +6665,18 @@
   <p:clrMapOvr>
     <a:masterClrMapping/>
   </p:clrMapOvr>
+  <mc:AlternateContent xmlns:mc="http://schemas.openxmlformats.org/markup-compatibility/2006">
+    <mc:Choice xmlns:p14="http://schemas.microsoft.com/office/powerpoint/2010/main" Requires="p14">
+      <p:transition spd="med" p14:dur="700">
+        <p:fade/>
+      </p:transition>
+    </mc:Choice>
+    <mc:Fallback>
+      <p:transition spd="med">
+        <p:fade/>
+      </p:transition>
+    </mc:Fallback>
+  </mc:AlternateContent>
 </p:sld>
 </file>
 
@@ -6772,6 +6982,18 @@
   <p:clrMapOvr>
     <a:masterClrMapping/>
   </p:clrMapOvr>
+  <mc:AlternateContent xmlns:mc="http://schemas.openxmlformats.org/markup-compatibility/2006">
+    <mc:Choice xmlns:p14="http://schemas.microsoft.com/office/powerpoint/2010/main" Requires="p14">
+      <p:transition spd="med" p14:dur="700">
+        <p:fade/>
+      </p:transition>
+    </mc:Choice>
+    <mc:Fallback>
+      <p:transition spd="med">
+        <p:fade/>
+      </p:transition>
+    </mc:Fallback>
+  </mc:AlternateContent>
 </p:sld>
 </file>
 
@@ -7077,6 +7299,18 @@
   <p:clrMapOvr>
     <a:masterClrMapping/>
   </p:clrMapOvr>
+  <mc:AlternateContent xmlns:mc="http://schemas.openxmlformats.org/markup-compatibility/2006">
+    <mc:Choice xmlns:p14="http://schemas.microsoft.com/office/powerpoint/2010/main" Requires="p14">
+      <p:transition spd="med" p14:dur="700">
+        <p:fade/>
+      </p:transition>
+    </mc:Choice>
+    <mc:Fallback>
+      <p:transition spd="med">
+        <p:fade/>
+      </p:transition>
+    </mc:Fallback>
+  </mc:AlternateContent>
 </p:sld>
 </file>
 
@@ -7532,6 +7766,18 @@
   <p:clrMapOvr>
     <a:masterClrMapping/>
   </p:clrMapOvr>
+  <mc:AlternateContent xmlns:mc="http://schemas.openxmlformats.org/markup-compatibility/2006">
+    <mc:Choice xmlns:p14="http://schemas.microsoft.com/office/powerpoint/2010/main" Requires="p14">
+      <p:transition spd="med" p14:dur="700">
+        <p:fade/>
+      </p:transition>
+    </mc:Choice>
+    <mc:Fallback>
+      <p:transition spd="med">
+        <p:fade/>
+      </p:transition>
+    </mc:Fallback>
+  </mc:AlternateContent>
 </p:sld>
 </file>
 
@@ -7759,6 +8005,18 @@
   <p:clrMapOvr>
     <a:masterClrMapping/>
   </p:clrMapOvr>
+  <mc:AlternateContent xmlns:mc="http://schemas.openxmlformats.org/markup-compatibility/2006">
+    <mc:Choice xmlns:p14="http://schemas.microsoft.com/office/powerpoint/2010/main" Requires="p14">
+      <p:transition spd="med" p14:dur="700">
+        <p:fade/>
+      </p:transition>
+    </mc:Choice>
+    <mc:Fallback>
+      <p:transition spd="med">
+        <p:fade/>
+      </p:transition>
+    </mc:Fallback>
+  </mc:AlternateContent>
 </p:sld>
 </file>
 
@@ -7968,6 +8226,18 @@
   <p:clrMapOvr>
     <a:masterClrMapping/>
   </p:clrMapOvr>
+  <mc:AlternateContent xmlns:mc="http://schemas.openxmlformats.org/markup-compatibility/2006">
+    <mc:Choice xmlns:p14="http://schemas.microsoft.com/office/powerpoint/2010/main" Requires="p14">
+      <p:transition spd="med" p14:dur="700">
+        <p:fade/>
+      </p:transition>
+    </mc:Choice>
+    <mc:Fallback>
+      <p:transition spd="med">
+        <p:fade/>
+      </p:transition>
+    </mc:Fallback>
+  </mc:AlternateContent>
 </p:sld>
 </file>
 
@@ -8154,6 +8424,18 @@
   <p:clrMapOvr>
     <a:masterClrMapping/>
   </p:clrMapOvr>
+  <mc:AlternateContent xmlns:mc="http://schemas.openxmlformats.org/markup-compatibility/2006">
+    <mc:Choice xmlns:p14="http://schemas.microsoft.com/office/powerpoint/2010/main" Requires="p14">
+      <p:transition spd="med" p14:dur="700">
+        <p:fade/>
+      </p:transition>
+    </mc:Choice>
+    <mc:Fallback>
+      <p:transition spd="med">
+        <p:fade/>
+      </p:transition>
+    </mc:Fallback>
+  </mc:AlternateContent>
 </p:sld>
 </file>
 
@@ -8348,6 +8630,18 @@
   <p:clrMapOvr>
     <a:masterClrMapping/>
   </p:clrMapOvr>
+  <mc:AlternateContent xmlns:mc="http://schemas.openxmlformats.org/markup-compatibility/2006">
+    <mc:Choice xmlns:p14="http://schemas.microsoft.com/office/powerpoint/2010/main" Requires="p14">
+      <p:transition spd="med" p14:dur="700">
+        <p:fade/>
+      </p:transition>
+    </mc:Choice>
+    <mc:Fallback>
+      <p:transition spd="med">
+        <p:fade/>
+      </p:transition>
+    </mc:Fallback>
+  </mc:AlternateContent>
 </p:sld>
 </file>
 
@@ -8933,6 +9227,18 @@
   <p:clrMapOvr>
     <a:masterClrMapping/>
   </p:clrMapOvr>
+  <mc:AlternateContent xmlns:mc="http://schemas.openxmlformats.org/markup-compatibility/2006">
+    <mc:Choice xmlns:p14="http://schemas.microsoft.com/office/powerpoint/2010/main" Requires="p14">
+      <p:transition spd="med" p14:dur="700">
+        <p:fade/>
+      </p:transition>
+    </mc:Choice>
+    <mc:Fallback>
+      <p:transition spd="med">
+        <p:fade/>
+      </p:transition>
+    </mc:Fallback>
+  </mc:AlternateContent>
 </p:sld>
 </file>
 
@@ -9577,13 +9883,34 @@
           <a:lstStyle/>
           <a:p>
             <a:r>
-              <a:rPr lang="da-DK" sz="4400" b="1">
+              <a:rPr lang="da-DK" sz="4400" b="1" dirty="0" err="1">
                 <a:solidFill>
                   <a:srgbClr val="FF0000"/>
                 </a:solidFill>
               </a:rPr>
-              <a:t>Instance fields</a:t>
-            </a:r>
+              <a:t>Instance</a:t>
+            </a:r>
+            <a:r>
+              <a:rPr lang="da-DK" sz="4400" b="1" dirty="0">
+                <a:solidFill>
+                  <a:srgbClr val="FF0000"/>
+                </a:solidFill>
+              </a:rPr>
+              <a:t> </a:t>
+            </a:r>
+            <a:r>
+              <a:rPr lang="da-DK" sz="4400" b="1" dirty="0" err="1">
+                <a:solidFill>
+                  <a:srgbClr val="FF0000"/>
+                </a:solidFill>
+              </a:rPr>
+              <a:t>fields</a:t>
+            </a:r>
+            <a:endParaRPr lang="da-DK" sz="4400" b="1" dirty="0">
+              <a:solidFill>
+                <a:srgbClr val="FF0000"/>
+              </a:solidFill>
+            </a:endParaRPr>
           </a:p>
         </p:txBody>
       </p:sp>
@@ -9597,6 +9924,18 @@
   <p:clrMapOvr>
     <a:masterClrMapping/>
   </p:clrMapOvr>
+  <mc:AlternateContent xmlns:mc="http://schemas.openxmlformats.org/markup-compatibility/2006">
+    <mc:Choice xmlns:p14="http://schemas.microsoft.com/office/powerpoint/2010/main" Requires="p14">
+      <p:transition spd="med" p14:dur="700">
+        <p:fade/>
+      </p:transition>
+    </mc:Choice>
+    <mc:Fallback>
+      <p:transition spd="med">
+        <p:fade/>
+      </p:transition>
+    </mc:Fallback>
+  </mc:AlternateContent>
 </p:sld>
 </file>
 
@@ -10261,6 +10600,18 @@
   <p:clrMapOvr>
     <a:masterClrMapping/>
   </p:clrMapOvr>
+  <mc:AlternateContent xmlns:mc="http://schemas.openxmlformats.org/markup-compatibility/2006">
+    <mc:Choice xmlns:p14="http://schemas.microsoft.com/office/powerpoint/2010/main" Requires="p14">
+      <p:transition spd="med" p14:dur="700">
+        <p:fade/>
+      </p:transition>
+    </mc:Choice>
+    <mc:Fallback>
+      <p:transition spd="med">
+        <p:fade/>
+      </p:transition>
+    </mc:Fallback>
+  </mc:AlternateContent>
 </p:sld>
 </file>
 
@@ -10925,6 +11276,18 @@
   <p:clrMapOvr>
     <a:masterClrMapping/>
   </p:clrMapOvr>
+  <mc:AlternateContent xmlns:mc="http://schemas.openxmlformats.org/markup-compatibility/2006">
+    <mc:Choice xmlns:p14="http://schemas.microsoft.com/office/powerpoint/2010/main" Requires="p14">
+      <p:transition spd="med" p14:dur="700">
+        <p:fade/>
+      </p:transition>
+    </mc:Choice>
+    <mc:Fallback>
+      <p:transition spd="med">
+        <p:fade/>
+      </p:transition>
+    </mc:Fallback>
+  </mc:AlternateContent>
 </p:sld>
 </file>
 
@@ -11569,7 +11932,7 @@
           <a:lstStyle/>
           <a:p>
             <a:r>
-              <a:rPr lang="da-DK" sz="4400" b="1">
+              <a:rPr lang="da-DK" sz="4400" b="1" dirty="0">
                 <a:solidFill>
                   <a:srgbClr val="FF0000"/>
                 </a:solidFill>
@@ -11589,6 +11952,963 @@
   <p:clrMapOvr>
     <a:masterClrMapping/>
   </p:clrMapOvr>
+  <mc:AlternateContent xmlns:mc="http://schemas.openxmlformats.org/markup-compatibility/2006">
+    <mc:Choice xmlns:p14="http://schemas.microsoft.com/office/powerpoint/2010/main" Requires="p14">
+      <p:transition spd="med" p14:dur="700">
+        <p:fade/>
+      </p:transition>
+    </mc:Choice>
+    <mc:Fallback>
+      <p:transition spd="med">
+        <p:fade/>
+      </p:transition>
+    </mc:Fallback>
+  </mc:AlternateContent>
+</p:sld>
+</file>
+
+<file path=ppt/slides/slide37.xml><?xml version="1.0" encoding="utf-8"?>
+<p:sld xmlns:a="http://schemas.openxmlformats.org/drawingml/2006/main" xmlns:r="http://schemas.openxmlformats.org/officeDocument/2006/relationships" xmlns:p="http://schemas.openxmlformats.org/presentationml/2006/main">
+  <p:cSld>
+    <p:spTree>
+      <p:nvGrpSpPr>
+        <p:cNvPr id="1" name=""/>
+        <p:cNvGrpSpPr/>
+        <p:nvPr/>
+      </p:nvGrpSpPr>
+      <p:grpSpPr>
+        <a:xfrm>
+          <a:off x="0" y="0"/>
+          <a:ext cx="0" cy="0"/>
+          <a:chOff x="0" y="0"/>
+          <a:chExt cx="0" cy="0"/>
+        </a:xfrm>
+      </p:grpSpPr>
+      <p:sp>
+        <p:nvSpPr>
+          <p:cNvPr id="2" name="Tekstfelt 1"/>
+          <p:cNvSpPr txBox="1"/>
+          <p:nvPr/>
+        </p:nvSpPr>
+        <p:spPr>
+          <a:xfrm>
+            <a:off x="920416" y="672345"/>
+            <a:ext cx="7257502" cy="3416320"/>
+          </a:xfrm>
+          <a:prstGeom prst="rect">
+            <a:avLst/>
+          </a:prstGeom>
+          <a:noFill/>
+        </p:spPr>
+        <p:txBody>
+          <a:bodyPr wrap="square" rtlCol="0">
+            <a:spAutoFit/>
+          </a:bodyPr>
+          <a:lstStyle/>
+          <a:p>
+            <a:r>
+              <a:rPr lang="da-DK" sz="3600" b="1" dirty="0">
+                <a:solidFill>
+                  <a:srgbClr val="0070C0"/>
+                </a:solidFill>
+                <a:latin typeface="Consolas" panose="020B0609020204030204" pitchFamily="49" charset="0"/>
+              </a:rPr>
+              <a:t>private int </a:t>
+            </a:r>
+            <a:r>
+              <a:rPr lang="da-DK" sz="3600" b="1" dirty="0">
+                <a:latin typeface="Consolas" panose="020B0609020204030204" pitchFamily="49" charset="0"/>
+              </a:rPr>
+              <a:t>_</a:t>
+            </a:r>
+            <a:r>
+              <a:rPr lang="da-DK" sz="3600" b="1" dirty="0" err="1">
+                <a:latin typeface="Consolas" panose="020B0609020204030204" pitchFamily="49" charset="0"/>
+              </a:rPr>
+              <a:t>price</a:t>
+            </a:r>
+            <a:r>
+              <a:rPr lang="da-DK" sz="3600" b="1" dirty="0">
+                <a:latin typeface="Consolas" panose="020B0609020204030204" pitchFamily="49" charset="0"/>
+              </a:rPr>
+              <a:t>;</a:t>
+            </a:r>
+          </a:p>
+          <a:p>
+            <a:r>
+              <a:rPr lang="da-DK" sz="3600" b="1" dirty="0">
+                <a:solidFill>
+                  <a:srgbClr val="0070C0"/>
+                </a:solidFill>
+                <a:latin typeface="Consolas" panose="020B0609020204030204" pitchFamily="49" charset="0"/>
+              </a:rPr>
+              <a:t>public int</a:t>
+            </a:r>
+            <a:r>
+              <a:rPr lang="da-DK" sz="3600" b="1" dirty="0">
+                <a:latin typeface="Consolas" panose="020B0609020204030204" pitchFamily="49" charset="0"/>
+              </a:rPr>
+              <a:t> Price</a:t>
+            </a:r>
+          </a:p>
+          <a:p>
+            <a:r>
+              <a:rPr lang="da-DK" sz="3600" b="1" dirty="0">
+                <a:latin typeface="Consolas" panose="020B0609020204030204" pitchFamily="49" charset="0"/>
+              </a:rPr>
+              <a:t>{</a:t>
+            </a:r>
+          </a:p>
+          <a:p>
+            <a:r>
+              <a:rPr lang="da-DK" sz="3600" b="1" dirty="0">
+                <a:latin typeface="Consolas" panose="020B0609020204030204" pitchFamily="49" charset="0"/>
+              </a:rPr>
+              <a:t>    </a:t>
+            </a:r>
+            <a:r>
+              <a:rPr lang="da-DK" sz="3600" b="1" dirty="0" err="1">
+                <a:solidFill>
+                  <a:srgbClr val="0070C0"/>
+                </a:solidFill>
+                <a:latin typeface="Consolas" panose="020B0609020204030204" pitchFamily="49" charset="0"/>
+              </a:rPr>
+              <a:t>get</a:t>
+            </a:r>
+            <a:r>
+              <a:rPr lang="da-DK" sz="3600" b="1" dirty="0">
+                <a:solidFill>
+                  <a:srgbClr val="0070C0"/>
+                </a:solidFill>
+                <a:latin typeface="Consolas" panose="020B0609020204030204" pitchFamily="49" charset="0"/>
+              </a:rPr>
+              <a:t> </a:t>
+            </a:r>
+            <a:r>
+              <a:rPr lang="da-DK" sz="3600" b="1" dirty="0">
+                <a:latin typeface="Consolas" panose="020B0609020204030204" pitchFamily="49" charset="0"/>
+              </a:rPr>
+              <a:t>{ </a:t>
+            </a:r>
+            <a:r>
+              <a:rPr lang="da-DK" sz="3600" b="1" dirty="0">
+                <a:solidFill>
+                  <a:srgbClr val="0070C0"/>
+                </a:solidFill>
+                <a:latin typeface="Consolas" panose="020B0609020204030204" pitchFamily="49" charset="0"/>
+              </a:rPr>
+              <a:t>return</a:t>
+            </a:r>
+            <a:r>
+              <a:rPr lang="da-DK" sz="3600" b="1" dirty="0">
+                <a:latin typeface="Consolas" panose="020B0609020204030204" pitchFamily="49" charset="0"/>
+              </a:rPr>
+              <a:t> _</a:t>
+            </a:r>
+            <a:r>
+              <a:rPr lang="da-DK" sz="3600" b="1" dirty="0" err="1">
+                <a:latin typeface="Consolas" panose="020B0609020204030204" pitchFamily="49" charset="0"/>
+              </a:rPr>
+              <a:t>price</a:t>
+            </a:r>
+            <a:r>
+              <a:rPr lang="da-DK" sz="3600" b="1" dirty="0">
+                <a:latin typeface="Consolas" panose="020B0609020204030204" pitchFamily="49" charset="0"/>
+              </a:rPr>
+              <a:t>; }</a:t>
+            </a:r>
+          </a:p>
+          <a:p>
+            <a:r>
+              <a:rPr lang="da-DK" sz="3600" b="1" dirty="0">
+                <a:latin typeface="Consolas" panose="020B0609020204030204" pitchFamily="49" charset="0"/>
+              </a:rPr>
+              <a:t>    </a:t>
+            </a:r>
+            <a:r>
+              <a:rPr lang="da-DK" sz="3600" b="1" dirty="0">
+                <a:solidFill>
+                  <a:srgbClr val="0070C0"/>
+                </a:solidFill>
+                <a:latin typeface="Consolas" panose="020B0609020204030204" pitchFamily="49" charset="0"/>
+              </a:rPr>
+              <a:t>set </a:t>
+            </a:r>
+            <a:r>
+              <a:rPr lang="da-DK" sz="3600" b="1" dirty="0">
+                <a:latin typeface="Consolas" panose="020B0609020204030204" pitchFamily="49" charset="0"/>
+              </a:rPr>
+              <a:t>{ _</a:t>
+            </a:r>
+            <a:r>
+              <a:rPr lang="da-DK" sz="3600" b="1" dirty="0" err="1">
+                <a:latin typeface="Consolas" panose="020B0609020204030204" pitchFamily="49" charset="0"/>
+              </a:rPr>
+              <a:t>price</a:t>
+            </a:r>
+            <a:r>
+              <a:rPr lang="da-DK" sz="3600" b="1" dirty="0">
+                <a:latin typeface="Consolas" panose="020B0609020204030204" pitchFamily="49" charset="0"/>
+              </a:rPr>
+              <a:t> = </a:t>
+            </a:r>
+            <a:r>
+              <a:rPr lang="da-DK" sz="3600" b="1" dirty="0" err="1">
+                <a:solidFill>
+                  <a:srgbClr val="0070C0"/>
+                </a:solidFill>
+                <a:latin typeface="Consolas" panose="020B0609020204030204" pitchFamily="49" charset="0"/>
+              </a:rPr>
+              <a:t>value</a:t>
+            </a:r>
+            <a:r>
+              <a:rPr lang="da-DK" sz="3600" b="1" dirty="0">
+                <a:latin typeface="Consolas" panose="020B0609020204030204" pitchFamily="49" charset="0"/>
+              </a:rPr>
+              <a:t>; }</a:t>
+            </a:r>
+          </a:p>
+          <a:p>
+            <a:r>
+              <a:rPr lang="da-DK" sz="3600" b="1" dirty="0">
+                <a:latin typeface="Consolas" panose="020B0609020204030204" pitchFamily="49" charset="0"/>
+              </a:rPr>
+              <a:t>}</a:t>
+            </a:r>
+          </a:p>
+        </p:txBody>
+      </p:sp>
+      <p:sp>
+        <p:nvSpPr>
+          <p:cNvPr id="3" name="Tekstfelt 2">
+            <a:extLst>
+              <a:ext uri="{FF2B5EF4-FFF2-40B4-BE49-F238E27FC236}">
+                <a16:creationId xmlns:a16="http://schemas.microsoft.com/office/drawing/2014/main" id="{201645D4-035F-55FB-4D6A-408415A1066E}"/>
+              </a:ext>
+            </a:extLst>
+          </p:cNvPr>
+          <p:cNvSpPr txBox="1"/>
+          <p:nvPr/>
+        </p:nvSpPr>
+        <p:spPr>
+          <a:xfrm>
+            <a:off x="8576395" y="770981"/>
+            <a:ext cx="3312895" cy="1077218"/>
+          </a:xfrm>
+          <a:prstGeom prst="rect">
+            <a:avLst/>
+          </a:prstGeom>
+          <a:noFill/>
+        </p:spPr>
+        <p:txBody>
+          <a:bodyPr wrap="none" rtlCol="0">
+            <a:spAutoFit/>
+          </a:bodyPr>
+          <a:lstStyle/>
+          <a:p>
+            <a:r>
+              <a:rPr lang="da-DK" sz="3200" b="1" dirty="0">
+                <a:solidFill>
+                  <a:srgbClr val="FF0000"/>
+                </a:solidFill>
+              </a:rPr>
+              <a:t>”Default” case for </a:t>
+            </a:r>
+          </a:p>
+          <a:p>
+            <a:r>
+              <a:rPr lang="da-DK" sz="3200" b="1" dirty="0">
+                <a:solidFill>
+                  <a:srgbClr val="FF0000"/>
+                </a:solidFill>
+              </a:rPr>
+              <a:t>a </a:t>
+            </a:r>
+            <a:r>
+              <a:rPr lang="da-DK" sz="3200" b="1" dirty="0" err="1">
+                <a:solidFill>
+                  <a:srgbClr val="FF0000"/>
+                </a:solidFill>
+              </a:rPr>
+              <a:t>property</a:t>
+            </a:r>
+            <a:endParaRPr lang="da-DK" sz="3200" b="1" dirty="0">
+              <a:solidFill>
+                <a:srgbClr val="FF0000"/>
+              </a:solidFill>
+            </a:endParaRPr>
+          </a:p>
+        </p:txBody>
+      </p:sp>
+    </p:spTree>
+    <p:extLst>
+      <p:ext uri="{BB962C8B-B14F-4D97-AF65-F5344CB8AC3E}">
+        <p14:creationId xmlns:p14="http://schemas.microsoft.com/office/powerpoint/2010/main" val="1275837"/>
+      </p:ext>
+    </p:extLst>
+  </p:cSld>
+  <p:clrMapOvr>
+    <a:masterClrMapping/>
+  </p:clrMapOvr>
+  <mc:AlternateContent xmlns:mc="http://schemas.openxmlformats.org/markup-compatibility/2006">
+    <mc:Choice xmlns:p14="http://schemas.microsoft.com/office/powerpoint/2010/main" Requires="p14">
+      <p:transition spd="med" p14:dur="700">
+        <p:fade/>
+      </p:transition>
+    </mc:Choice>
+    <mc:Fallback>
+      <p:transition spd="med">
+        <p:fade/>
+      </p:transition>
+    </mc:Fallback>
+  </mc:AlternateContent>
+  <p:timing>
+    <p:tnLst>
+      <p:par>
+        <p:cTn id="1" dur="indefinite" restart="never" nodeType="tmRoot">
+          <p:childTnLst>
+            <p:seq concurrent="1" nextAc="seek">
+              <p:cTn id="2" dur="indefinite" nodeType="mainSeq">
+                <p:childTnLst>
+                  <p:par>
+                    <p:cTn id="3" fill="hold">
+                      <p:stCondLst>
+                        <p:cond delay="indefinite"/>
+                      </p:stCondLst>
+                      <p:childTnLst>
+                        <p:par>
+                          <p:cTn id="4" fill="hold">
+                            <p:stCondLst>
+                              <p:cond delay="0"/>
+                            </p:stCondLst>
+                            <p:childTnLst>
+                              <p:par>
+                                <p:cTn id="5" presetID="10" presetClass="entr" presetSubtype="0" fill="hold" grpId="0" nodeType="clickEffect">
+                                  <p:stCondLst>
+                                    <p:cond delay="0"/>
+                                  </p:stCondLst>
+                                  <p:childTnLst>
+                                    <p:set>
+                                      <p:cBhvr>
+                                        <p:cTn id="6" dur="1" fill="hold">
+                                          <p:stCondLst>
+                                            <p:cond delay="0"/>
+                                          </p:stCondLst>
+                                        </p:cTn>
+                                        <p:tgtEl>
+                                          <p:spTgt spid="3"/>
+                                        </p:tgtEl>
+                                        <p:attrNameLst>
+                                          <p:attrName>style.visibility</p:attrName>
+                                        </p:attrNameLst>
+                                      </p:cBhvr>
+                                      <p:to>
+                                        <p:strVal val="visible"/>
+                                      </p:to>
+                                    </p:set>
+                                    <p:animEffect transition="in" filter="fade">
+                                      <p:cBhvr>
+                                        <p:cTn id="7" dur="500"/>
+                                        <p:tgtEl>
+                                          <p:spTgt spid="3"/>
+                                        </p:tgtEl>
+                                      </p:cBhvr>
+                                    </p:animEffect>
+                                  </p:childTnLst>
+                                </p:cTn>
+                              </p:par>
+                            </p:childTnLst>
+                          </p:cTn>
+                        </p:par>
+                      </p:childTnLst>
+                    </p:cTn>
+                  </p:par>
+                </p:childTnLst>
+              </p:cTn>
+              <p:prevCondLst>
+                <p:cond evt="onPrev" delay="0">
+                  <p:tgtEl>
+                    <p:sldTgt/>
+                  </p:tgtEl>
+                </p:cond>
+              </p:prevCondLst>
+              <p:nextCondLst>
+                <p:cond evt="onNext" delay="0">
+                  <p:tgtEl>
+                    <p:sldTgt/>
+                  </p:tgtEl>
+                </p:cond>
+              </p:nextCondLst>
+            </p:seq>
+          </p:childTnLst>
+        </p:cTn>
+      </p:par>
+    </p:tnLst>
+    <p:bldLst>
+      <p:bldP spid="3" grpId="0"/>
+    </p:bldLst>
+  </p:timing>
+</p:sld>
+</file>
+
+<file path=ppt/slides/slide38.xml><?xml version="1.0" encoding="utf-8"?>
+<p:sld xmlns:a="http://schemas.openxmlformats.org/drawingml/2006/main" xmlns:r="http://schemas.openxmlformats.org/officeDocument/2006/relationships" xmlns:p="http://schemas.openxmlformats.org/presentationml/2006/main">
+  <p:cSld>
+    <p:spTree>
+      <p:nvGrpSpPr>
+        <p:cNvPr id="1" name=""/>
+        <p:cNvGrpSpPr/>
+        <p:nvPr/>
+      </p:nvGrpSpPr>
+      <p:grpSpPr>
+        <a:xfrm>
+          <a:off x="0" y="0"/>
+          <a:ext cx="0" cy="0"/>
+          <a:chOff x="0" y="0"/>
+          <a:chExt cx="0" cy="0"/>
+        </a:xfrm>
+      </p:grpSpPr>
+      <p:sp>
+        <p:nvSpPr>
+          <p:cNvPr id="2" name="Tekstfelt 1"/>
+          <p:cNvSpPr txBox="1"/>
+          <p:nvPr/>
+        </p:nvSpPr>
+        <p:spPr>
+          <a:xfrm>
+            <a:off x="920416" y="672345"/>
+            <a:ext cx="4739196" cy="2862322"/>
+          </a:xfrm>
+          <a:prstGeom prst="rect">
+            <a:avLst/>
+          </a:prstGeom>
+          <a:noFill/>
+        </p:spPr>
+        <p:txBody>
+          <a:bodyPr wrap="square" rtlCol="0">
+            <a:spAutoFit/>
+          </a:bodyPr>
+          <a:lstStyle/>
+          <a:p>
+            <a:r>
+              <a:rPr lang="da-DK" sz="3600" b="1" dirty="0">
+                <a:solidFill>
+                  <a:srgbClr val="0070C0"/>
+                </a:solidFill>
+                <a:latin typeface="Consolas" panose="020B0609020204030204" pitchFamily="49" charset="0"/>
+              </a:rPr>
+              <a:t>public int</a:t>
+            </a:r>
+            <a:r>
+              <a:rPr lang="da-DK" sz="3600" b="1" dirty="0">
+                <a:latin typeface="Consolas" panose="020B0609020204030204" pitchFamily="49" charset="0"/>
+              </a:rPr>
+              <a:t> Price</a:t>
+            </a:r>
+          </a:p>
+          <a:p>
+            <a:r>
+              <a:rPr lang="da-DK" sz="3600" b="1" dirty="0">
+                <a:latin typeface="Consolas" panose="020B0609020204030204" pitchFamily="49" charset="0"/>
+              </a:rPr>
+              <a:t>{</a:t>
+            </a:r>
+          </a:p>
+          <a:p>
+            <a:r>
+              <a:rPr lang="da-DK" sz="3600" b="1" dirty="0">
+                <a:latin typeface="Consolas" panose="020B0609020204030204" pitchFamily="49" charset="0"/>
+              </a:rPr>
+              <a:t>    </a:t>
+            </a:r>
+            <a:r>
+              <a:rPr lang="da-DK" sz="3600" b="1" dirty="0" err="1">
+                <a:solidFill>
+                  <a:srgbClr val="0070C0"/>
+                </a:solidFill>
+                <a:latin typeface="Consolas" panose="020B0609020204030204" pitchFamily="49" charset="0"/>
+              </a:rPr>
+              <a:t>get</a:t>
+            </a:r>
+            <a:r>
+              <a:rPr lang="da-DK" sz="3600" b="1" dirty="0">
+                <a:latin typeface="Consolas" panose="020B0609020204030204" pitchFamily="49" charset="0"/>
+              </a:rPr>
+              <a:t>;</a:t>
+            </a:r>
+          </a:p>
+          <a:p>
+            <a:r>
+              <a:rPr lang="da-DK" sz="3600" b="1" dirty="0">
+                <a:latin typeface="Consolas" panose="020B0609020204030204" pitchFamily="49" charset="0"/>
+              </a:rPr>
+              <a:t>    </a:t>
+            </a:r>
+            <a:r>
+              <a:rPr lang="da-DK" sz="3600" b="1" dirty="0">
+                <a:solidFill>
+                  <a:srgbClr val="0070C0"/>
+                </a:solidFill>
+                <a:latin typeface="Consolas" panose="020B0609020204030204" pitchFamily="49" charset="0"/>
+              </a:rPr>
+              <a:t>set</a:t>
+            </a:r>
+            <a:r>
+              <a:rPr lang="da-DK" sz="3600" b="1" dirty="0">
+                <a:latin typeface="Consolas" panose="020B0609020204030204" pitchFamily="49" charset="0"/>
+              </a:rPr>
+              <a:t>;</a:t>
+            </a:r>
+          </a:p>
+          <a:p>
+            <a:r>
+              <a:rPr lang="da-DK" sz="3600" b="1" dirty="0">
+                <a:latin typeface="Consolas" panose="020B0609020204030204" pitchFamily="49" charset="0"/>
+              </a:rPr>
+              <a:t>}</a:t>
+            </a:r>
+          </a:p>
+        </p:txBody>
+      </p:sp>
+      <p:sp>
+        <p:nvSpPr>
+          <p:cNvPr id="3" name="Tekstfelt 2">
+            <a:extLst>
+              <a:ext uri="{FF2B5EF4-FFF2-40B4-BE49-F238E27FC236}">
+                <a16:creationId xmlns:a16="http://schemas.microsoft.com/office/drawing/2014/main" id="{201645D4-035F-55FB-4D6A-408415A1066E}"/>
+              </a:ext>
+            </a:extLst>
+          </p:cNvPr>
+          <p:cNvSpPr txBox="1"/>
+          <p:nvPr/>
+        </p:nvSpPr>
+        <p:spPr>
+          <a:xfrm>
+            <a:off x="6852328" y="787094"/>
+            <a:ext cx="4184923" cy="4708981"/>
+          </a:xfrm>
+          <a:prstGeom prst="rect">
+            <a:avLst/>
+          </a:prstGeom>
+          <a:noFill/>
+        </p:spPr>
+        <p:txBody>
+          <a:bodyPr wrap="square" rtlCol="0">
+            <a:spAutoFit/>
+          </a:bodyPr>
+          <a:lstStyle/>
+          <a:p>
+            <a:r>
+              <a:rPr lang="da-DK" sz="4400" b="1" dirty="0">
+                <a:solidFill>
+                  <a:srgbClr val="FF0000"/>
+                </a:solidFill>
+              </a:rPr>
+              <a:t>Auto-</a:t>
+            </a:r>
+            <a:r>
+              <a:rPr lang="da-DK" sz="4400" b="1" dirty="0" err="1">
+                <a:solidFill>
+                  <a:srgbClr val="FF0000"/>
+                </a:solidFill>
+              </a:rPr>
+              <a:t>property</a:t>
+            </a:r>
+            <a:r>
+              <a:rPr lang="da-DK" sz="4400" b="1" dirty="0">
+                <a:solidFill>
+                  <a:srgbClr val="FF0000"/>
+                </a:solidFill>
+              </a:rPr>
+              <a:t>!</a:t>
+            </a:r>
+          </a:p>
+          <a:p>
+            <a:endParaRPr lang="da-DK" sz="3200" b="1" dirty="0">
+              <a:solidFill>
+                <a:srgbClr val="FF0000"/>
+              </a:solidFill>
+            </a:endParaRPr>
+          </a:p>
+          <a:p>
+            <a:r>
+              <a:rPr lang="da-DK" sz="3200" b="1" dirty="0" err="1">
+                <a:solidFill>
+                  <a:srgbClr val="FF0000"/>
+                </a:solidFill>
+              </a:rPr>
+              <a:t>Simpler</a:t>
+            </a:r>
+            <a:r>
+              <a:rPr lang="da-DK" sz="3200" b="1" dirty="0">
+                <a:solidFill>
+                  <a:srgbClr val="FF0000"/>
+                </a:solidFill>
+              </a:rPr>
+              <a:t> </a:t>
+            </a:r>
+            <a:r>
+              <a:rPr lang="da-DK" sz="3200" b="1" dirty="0" err="1">
+                <a:solidFill>
+                  <a:srgbClr val="FF0000"/>
+                </a:solidFill>
+              </a:rPr>
+              <a:t>syntax</a:t>
+            </a:r>
+            <a:endParaRPr lang="da-DK" sz="3200" b="1" dirty="0">
+              <a:solidFill>
+                <a:srgbClr val="FF0000"/>
+              </a:solidFill>
+            </a:endParaRPr>
+          </a:p>
+          <a:p>
+            <a:endParaRPr lang="da-DK" sz="3200" b="1" dirty="0">
+              <a:solidFill>
+                <a:srgbClr val="FF0000"/>
+              </a:solidFill>
+            </a:endParaRPr>
+          </a:p>
+          <a:p>
+            <a:r>
+              <a:rPr lang="da-DK" sz="3200" b="1" dirty="0">
+                <a:solidFill>
+                  <a:srgbClr val="FF0000"/>
+                </a:solidFill>
+              </a:rPr>
+              <a:t>Same </a:t>
+            </a:r>
+            <a:r>
+              <a:rPr lang="da-DK" sz="3200" b="1" dirty="0" err="1">
+                <a:solidFill>
+                  <a:srgbClr val="FF0000"/>
+                </a:solidFill>
+              </a:rPr>
+              <a:t>logic</a:t>
+            </a:r>
+            <a:r>
+              <a:rPr lang="da-DK" sz="3200" b="1" dirty="0">
+                <a:solidFill>
+                  <a:srgbClr val="FF0000"/>
+                </a:solidFill>
+              </a:rPr>
+              <a:t> as </a:t>
+            </a:r>
+          </a:p>
+          <a:p>
+            <a:r>
+              <a:rPr lang="da-DK" sz="3200" b="1" dirty="0" err="1">
+                <a:solidFill>
+                  <a:srgbClr val="FF0000"/>
+                </a:solidFill>
+              </a:rPr>
+              <a:t>before</a:t>
+            </a:r>
+            <a:r>
+              <a:rPr lang="da-DK" sz="3200" b="1" dirty="0">
+                <a:solidFill>
+                  <a:srgbClr val="FF0000"/>
+                </a:solidFill>
+              </a:rPr>
+              <a:t>!</a:t>
+            </a:r>
+          </a:p>
+          <a:p>
+            <a:endParaRPr lang="da-DK" sz="3200" b="1" dirty="0">
+              <a:solidFill>
+                <a:srgbClr val="FF0000"/>
+              </a:solidFill>
+            </a:endParaRPr>
+          </a:p>
+          <a:p>
+            <a:r>
+              <a:rPr lang="da-DK" sz="3200" b="1" dirty="0" err="1">
+                <a:solidFill>
+                  <a:srgbClr val="FF0000"/>
+                </a:solidFill>
+              </a:rPr>
+              <a:t>Cannot</a:t>
+            </a:r>
+            <a:r>
+              <a:rPr lang="da-DK" sz="3200" b="1" dirty="0">
+                <a:solidFill>
+                  <a:srgbClr val="FF0000"/>
+                </a:solidFill>
+              </a:rPr>
+              <a:t> </a:t>
+            </a:r>
+            <a:r>
+              <a:rPr lang="da-DK" sz="3200" b="1" dirty="0" err="1">
+                <a:solidFill>
+                  <a:srgbClr val="FF0000"/>
+                </a:solidFill>
+              </a:rPr>
+              <a:t>access</a:t>
+            </a:r>
+            <a:r>
+              <a:rPr lang="da-DK" sz="3200" b="1" dirty="0">
+                <a:solidFill>
+                  <a:srgbClr val="FF0000"/>
+                </a:solidFill>
+              </a:rPr>
+              <a:t> </a:t>
+            </a:r>
+          </a:p>
+          <a:p>
+            <a:r>
+              <a:rPr lang="da-DK" sz="3200" b="1" dirty="0" err="1">
+                <a:solidFill>
+                  <a:srgbClr val="FF0000"/>
+                </a:solidFill>
+              </a:rPr>
+              <a:t>Instance</a:t>
+            </a:r>
+            <a:r>
+              <a:rPr lang="da-DK" sz="3200" b="1" dirty="0">
+                <a:solidFill>
+                  <a:srgbClr val="FF0000"/>
+                </a:solidFill>
+              </a:rPr>
+              <a:t> </a:t>
+            </a:r>
+            <a:r>
+              <a:rPr lang="da-DK" sz="3200" b="1" dirty="0" err="1">
+                <a:solidFill>
+                  <a:srgbClr val="FF0000"/>
+                </a:solidFill>
+              </a:rPr>
+              <a:t>field</a:t>
+            </a:r>
+            <a:r>
+              <a:rPr lang="da-DK" sz="3200" b="1" dirty="0">
+                <a:solidFill>
+                  <a:srgbClr val="FF0000"/>
+                </a:solidFill>
+              </a:rPr>
+              <a:t>!</a:t>
+            </a:r>
+          </a:p>
+        </p:txBody>
+      </p:sp>
+    </p:spTree>
+    <p:extLst>
+      <p:ext uri="{BB962C8B-B14F-4D97-AF65-F5344CB8AC3E}">
+        <p14:creationId xmlns:p14="http://schemas.microsoft.com/office/powerpoint/2010/main" val="560060950"/>
+      </p:ext>
+    </p:extLst>
+  </p:cSld>
+  <p:clrMapOvr>
+    <a:masterClrMapping/>
+  </p:clrMapOvr>
+  <mc:AlternateContent xmlns:mc="http://schemas.openxmlformats.org/markup-compatibility/2006">
+    <mc:Choice xmlns:p14="http://schemas.microsoft.com/office/powerpoint/2010/main" Requires="p14">
+      <p:transition spd="med" p14:dur="700">
+        <p:fade/>
+      </p:transition>
+    </mc:Choice>
+    <mc:Fallback>
+      <p:transition spd="med">
+        <p:fade/>
+      </p:transition>
+    </mc:Fallback>
+  </mc:AlternateContent>
+  <p:timing>
+    <p:tnLst>
+      <p:par>
+        <p:cTn id="1" dur="indefinite" restart="never" nodeType="tmRoot">
+          <p:childTnLst>
+            <p:seq concurrent="1" nextAc="seek">
+              <p:cTn id="2" dur="indefinite" nodeType="mainSeq">
+                <p:childTnLst>
+                  <p:par>
+                    <p:cTn id="3" fill="hold">
+                      <p:stCondLst>
+                        <p:cond delay="indefinite"/>
+                      </p:stCondLst>
+                      <p:childTnLst>
+                        <p:par>
+                          <p:cTn id="4" fill="hold">
+                            <p:stCondLst>
+                              <p:cond delay="0"/>
+                            </p:stCondLst>
+                            <p:childTnLst>
+                              <p:par>
+                                <p:cTn id="5" presetID="10" presetClass="entr" presetSubtype="0" fill="hold" grpId="0" nodeType="clickEffect">
+                                  <p:stCondLst>
+                                    <p:cond delay="0"/>
+                                  </p:stCondLst>
+                                  <p:childTnLst>
+                                    <p:set>
+                                      <p:cBhvr>
+                                        <p:cTn id="6" dur="1" fill="hold">
+                                          <p:stCondLst>
+                                            <p:cond delay="0"/>
+                                          </p:stCondLst>
+                                        </p:cTn>
+                                        <p:tgtEl>
+                                          <p:spTgt spid="3"/>
+                                        </p:tgtEl>
+                                        <p:attrNameLst>
+                                          <p:attrName>style.visibility</p:attrName>
+                                        </p:attrNameLst>
+                                      </p:cBhvr>
+                                      <p:to>
+                                        <p:strVal val="visible"/>
+                                      </p:to>
+                                    </p:set>
+                                    <p:animEffect transition="in" filter="fade">
+                                      <p:cBhvr>
+                                        <p:cTn id="7" dur="500"/>
+                                        <p:tgtEl>
+                                          <p:spTgt spid="3"/>
+                                        </p:tgtEl>
+                                      </p:cBhvr>
+                                    </p:animEffect>
+                                  </p:childTnLst>
+                                </p:cTn>
+                              </p:par>
+                            </p:childTnLst>
+                          </p:cTn>
+                        </p:par>
+                      </p:childTnLst>
+                    </p:cTn>
+                  </p:par>
+                </p:childTnLst>
+              </p:cTn>
+              <p:prevCondLst>
+                <p:cond evt="onPrev" delay="0">
+                  <p:tgtEl>
+                    <p:sldTgt/>
+                  </p:tgtEl>
+                </p:cond>
+              </p:prevCondLst>
+              <p:nextCondLst>
+                <p:cond evt="onNext" delay="0">
+                  <p:tgtEl>
+                    <p:sldTgt/>
+                  </p:tgtEl>
+                </p:cond>
+              </p:nextCondLst>
+            </p:seq>
+          </p:childTnLst>
+        </p:cTn>
+      </p:par>
+    </p:tnLst>
+    <p:bldLst>
+      <p:bldP spid="3" grpId="0"/>
+    </p:bldLst>
+  </p:timing>
+</p:sld>
+</file>
+
+<file path=ppt/slides/slide39.xml><?xml version="1.0" encoding="utf-8"?>
+<p:sld xmlns:a="http://schemas.openxmlformats.org/drawingml/2006/main" xmlns:r="http://schemas.openxmlformats.org/officeDocument/2006/relationships" xmlns:p="http://schemas.openxmlformats.org/presentationml/2006/main">
+  <p:cSld>
+    <p:spTree>
+      <p:nvGrpSpPr>
+        <p:cNvPr id="1" name=""/>
+        <p:cNvGrpSpPr/>
+        <p:nvPr/>
+      </p:nvGrpSpPr>
+      <p:grpSpPr>
+        <a:xfrm>
+          <a:off x="0" y="0"/>
+          <a:ext cx="0" cy="0"/>
+          <a:chOff x="0" y="0"/>
+          <a:chExt cx="0" cy="0"/>
+        </a:xfrm>
+      </p:grpSpPr>
+      <p:sp>
+        <p:nvSpPr>
+          <p:cNvPr id="2" name="Tekstfelt 1"/>
+          <p:cNvSpPr txBox="1"/>
+          <p:nvPr/>
+        </p:nvSpPr>
+        <p:spPr>
+          <a:xfrm>
+            <a:off x="920415" y="672345"/>
+            <a:ext cx="7957723" cy="646331"/>
+          </a:xfrm>
+          <a:prstGeom prst="rect">
+            <a:avLst/>
+          </a:prstGeom>
+          <a:noFill/>
+        </p:spPr>
+        <p:txBody>
+          <a:bodyPr wrap="square" rtlCol="0">
+            <a:spAutoFit/>
+          </a:bodyPr>
+          <a:lstStyle/>
+          <a:p>
+            <a:r>
+              <a:rPr lang="da-DK" sz="3600" b="1" dirty="0">
+                <a:solidFill>
+                  <a:srgbClr val="0070C0"/>
+                </a:solidFill>
+                <a:latin typeface="Consolas" panose="020B0609020204030204" pitchFamily="49" charset="0"/>
+              </a:rPr>
+              <a:t>public int</a:t>
+            </a:r>
+            <a:r>
+              <a:rPr lang="da-DK" sz="3600" b="1" dirty="0">
+                <a:latin typeface="Consolas" panose="020B0609020204030204" pitchFamily="49" charset="0"/>
+              </a:rPr>
+              <a:t> Price { </a:t>
+            </a:r>
+            <a:r>
+              <a:rPr lang="da-DK" sz="3600" b="1" dirty="0" err="1">
+                <a:solidFill>
+                  <a:srgbClr val="0070C0"/>
+                </a:solidFill>
+                <a:latin typeface="Consolas" panose="020B0609020204030204" pitchFamily="49" charset="0"/>
+              </a:rPr>
+              <a:t>get</a:t>
+            </a:r>
+            <a:r>
+              <a:rPr lang="da-DK" sz="3600" b="1" dirty="0">
+                <a:latin typeface="Consolas" panose="020B0609020204030204" pitchFamily="49" charset="0"/>
+              </a:rPr>
+              <a:t>; </a:t>
+            </a:r>
+            <a:r>
+              <a:rPr lang="da-DK" sz="3600" b="1" dirty="0">
+                <a:solidFill>
+                  <a:srgbClr val="0070C0"/>
+                </a:solidFill>
+                <a:latin typeface="Consolas" panose="020B0609020204030204" pitchFamily="49" charset="0"/>
+              </a:rPr>
+              <a:t>set</a:t>
+            </a:r>
+            <a:r>
+              <a:rPr lang="da-DK" sz="3600" b="1" dirty="0">
+                <a:latin typeface="Consolas" panose="020B0609020204030204" pitchFamily="49" charset="0"/>
+              </a:rPr>
+              <a:t>; }</a:t>
+            </a:r>
+          </a:p>
+        </p:txBody>
+      </p:sp>
+    </p:spTree>
+    <p:extLst>
+      <p:ext uri="{BB962C8B-B14F-4D97-AF65-F5344CB8AC3E}">
+        <p14:creationId xmlns:p14="http://schemas.microsoft.com/office/powerpoint/2010/main" val="394778829"/>
+      </p:ext>
+    </p:extLst>
+  </p:cSld>
+  <p:clrMapOvr>
+    <a:masterClrMapping/>
+  </p:clrMapOvr>
+  <mc:AlternateContent xmlns:mc="http://schemas.openxmlformats.org/markup-compatibility/2006">
+    <mc:Choice xmlns:p14="http://schemas.microsoft.com/office/powerpoint/2010/main" Requires="p14">
+      <p:transition spd="med" p14:dur="700">
+        <p:fade/>
+      </p:transition>
+    </mc:Choice>
+    <mc:Fallback>
+      <p:transition spd="med">
+        <p:fade/>
+      </p:transition>
+    </mc:Fallback>
+  </mc:AlternateContent>
 </p:sld>
 </file>
 
@@ -11756,6 +13076,1280 @@
   <p:clrMapOvr>
     <a:masterClrMapping/>
   </p:clrMapOvr>
+  <mc:AlternateContent xmlns:mc="http://schemas.openxmlformats.org/markup-compatibility/2006">
+    <mc:Choice xmlns:p14="http://schemas.microsoft.com/office/powerpoint/2010/main" Requires="p14">
+      <p:transition spd="med" p14:dur="700">
+        <p:fade/>
+      </p:transition>
+    </mc:Choice>
+    <mc:Fallback>
+      <p:transition spd="med">
+        <p:fade/>
+      </p:transition>
+    </mc:Fallback>
+  </mc:AlternateContent>
+</p:sld>
+</file>
+
+<file path=ppt/slides/slide40.xml><?xml version="1.0" encoding="utf-8"?>
+<p:sld xmlns:a="http://schemas.openxmlformats.org/drawingml/2006/main" xmlns:r="http://schemas.openxmlformats.org/officeDocument/2006/relationships" xmlns:p="http://schemas.openxmlformats.org/presentationml/2006/main">
+  <p:cSld>
+    <p:spTree>
+      <p:nvGrpSpPr>
+        <p:cNvPr id="1" name=""/>
+        <p:cNvGrpSpPr/>
+        <p:nvPr/>
+      </p:nvGrpSpPr>
+      <p:grpSpPr>
+        <a:xfrm>
+          <a:off x="0" y="0"/>
+          <a:ext cx="0" cy="0"/>
+          <a:chOff x="0" y="0"/>
+          <a:chExt cx="0" cy="0"/>
+        </a:xfrm>
+      </p:grpSpPr>
+      <p:sp>
+        <p:nvSpPr>
+          <p:cNvPr id="2" name="Tekstfelt 1"/>
+          <p:cNvSpPr txBox="1"/>
+          <p:nvPr/>
+        </p:nvSpPr>
+        <p:spPr>
+          <a:xfrm>
+            <a:off x="920416" y="672345"/>
+            <a:ext cx="5541344" cy="5478423"/>
+          </a:xfrm>
+          <a:prstGeom prst="rect">
+            <a:avLst/>
+          </a:prstGeom>
+          <a:noFill/>
+        </p:spPr>
+        <p:txBody>
+          <a:bodyPr wrap="square" rtlCol="0">
+            <a:spAutoFit/>
+          </a:bodyPr>
+          <a:lstStyle/>
+          <a:p>
+            <a:r>
+              <a:rPr lang="da-DK" sz="1000" b="1">
+                <a:solidFill>
+                  <a:srgbClr val="0070C0"/>
+                </a:solidFill>
+                <a:latin typeface="Consolas" panose="020B0609020204030204" pitchFamily="49" charset="0"/>
+              </a:rPr>
+              <a:t>public class</a:t>
+            </a:r>
+            <a:r>
+              <a:rPr lang="da-DK" sz="1000" b="1">
+                <a:latin typeface="Consolas" panose="020B0609020204030204" pitchFamily="49" charset="0"/>
+              </a:rPr>
+              <a:t> Car</a:t>
+            </a:r>
+          </a:p>
+          <a:p>
+            <a:r>
+              <a:rPr lang="da-DK" sz="1000" b="1">
+                <a:latin typeface="Consolas" panose="020B0609020204030204" pitchFamily="49" charset="0"/>
+              </a:rPr>
+              <a:t>{</a:t>
+            </a:r>
+          </a:p>
+          <a:p>
+            <a:r>
+              <a:rPr lang="da-DK" sz="1000" b="1">
+                <a:latin typeface="Consolas" panose="020B0609020204030204" pitchFamily="49" charset="0"/>
+              </a:rPr>
+              <a:t>    </a:t>
+            </a:r>
+            <a:r>
+              <a:rPr lang="da-DK" sz="1000" b="1">
+                <a:solidFill>
+                  <a:srgbClr val="0070C0"/>
+                </a:solidFill>
+                <a:latin typeface="Consolas" panose="020B0609020204030204" pitchFamily="49" charset="0"/>
+              </a:rPr>
+              <a:t>private string </a:t>
+            </a:r>
+            <a:r>
+              <a:rPr lang="da-DK" sz="1000" b="1">
+                <a:latin typeface="Consolas" panose="020B0609020204030204" pitchFamily="49" charset="0"/>
+              </a:rPr>
+              <a:t>_licensePlate;</a:t>
+            </a:r>
+          </a:p>
+          <a:p>
+            <a:r>
+              <a:rPr lang="da-DK" sz="1000" b="1">
+                <a:latin typeface="Consolas" panose="020B0609020204030204" pitchFamily="49" charset="0"/>
+              </a:rPr>
+              <a:t>    </a:t>
+            </a:r>
+            <a:r>
+              <a:rPr lang="da-DK" sz="1000" b="1">
+                <a:solidFill>
+                  <a:srgbClr val="0070C0"/>
+                </a:solidFill>
+                <a:latin typeface="Consolas" panose="020B0609020204030204" pitchFamily="49" charset="0"/>
+              </a:rPr>
+              <a:t>private string </a:t>
+            </a:r>
+            <a:r>
+              <a:rPr lang="da-DK" sz="1000" b="1">
+                <a:latin typeface="Consolas" panose="020B0609020204030204" pitchFamily="49" charset="0"/>
+              </a:rPr>
+              <a:t>_brand;</a:t>
+            </a:r>
+          </a:p>
+          <a:p>
+            <a:r>
+              <a:rPr lang="da-DK" sz="1000" b="1">
+                <a:latin typeface="Consolas" panose="020B0609020204030204" pitchFamily="49" charset="0"/>
+              </a:rPr>
+              <a:t>    </a:t>
+            </a:r>
+            <a:r>
+              <a:rPr lang="da-DK" sz="1000" b="1">
+                <a:solidFill>
+                  <a:srgbClr val="0070C0"/>
+                </a:solidFill>
+                <a:latin typeface="Consolas" panose="020B0609020204030204" pitchFamily="49" charset="0"/>
+              </a:rPr>
+              <a:t>private string </a:t>
+            </a:r>
+            <a:r>
+              <a:rPr lang="da-DK" sz="1000" b="1">
+                <a:latin typeface="Consolas" panose="020B0609020204030204" pitchFamily="49" charset="0"/>
+              </a:rPr>
+              <a:t>_model;</a:t>
+            </a:r>
+          </a:p>
+          <a:p>
+            <a:r>
+              <a:rPr lang="da-DK" sz="1000" b="1">
+                <a:latin typeface="Consolas" panose="020B0609020204030204" pitchFamily="49" charset="0"/>
+              </a:rPr>
+              <a:t>    </a:t>
+            </a:r>
+            <a:r>
+              <a:rPr lang="da-DK" sz="1000" b="1">
+                <a:solidFill>
+                  <a:srgbClr val="0070C0"/>
+                </a:solidFill>
+                <a:latin typeface="Consolas" panose="020B0609020204030204" pitchFamily="49" charset="0"/>
+              </a:rPr>
+              <a:t>private int </a:t>
+            </a:r>
+            <a:r>
+              <a:rPr lang="da-DK" sz="1000" b="1">
+                <a:latin typeface="Consolas" panose="020B0609020204030204" pitchFamily="49" charset="0"/>
+              </a:rPr>
+              <a:t>_price;</a:t>
+            </a:r>
+          </a:p>
+          <a:p>
+            <a:endParaRPr lang="da-DK" sz="1000" b="1">
+              <a:latin typeface="Consolas" panose="020B0609020204030204" pitchFamily="49" charset="0"/>
+            </a:endParaRPr>
+          </a:p>
+          <a:p>
+            <a:r>
+              <a:rPr lang="da-DK" sz="1000" b="1">
+                <a:solidFill>
+                  <a:srgbClr val="0070C0"/>
+                </a:solidFill>
+                <a:latin typeface="Consolas" panose="020B0609020204030204" pitchFamily="49" charset="0"/>
+              </a:rPr>
+              <a:t>    public </a:t>
+            </a:r>
+            <a:r>
+              <a:rPr lang="da-DK" sz="1000" b="1">
+                <a:latin typeface="Consolas" panose="020B0609020204030204" pitchFamily="49" charset="0"/>
+              </a:rPr>
+              <a:t>Car(</a:t>
+            </a:r>
+            <a:r>
+              <a:rPr lang="da-DK" sz="1000" b="1">
+                <a:solidFill>
+                  <a:srgbClr val="0070C0"/>
+                </a:solidFill>
+                <a:latin typeface="Consolas" panose="020B0609020204030204" pitchFamily="49" charset="0"/>
+              </a:rPr>
+              <a:t>string</a:t>
+            </a:r>
+            <a:r>
+              <a:rPr lang="da-DK" sz="1000" b="1">
+                <a:latin typeface="Consolas" panose="020B0609020204030204" pitchFamily="49" charset="0"/>
+              </a:rPr>
+              <a:t> licensePlate, </a:t>
+            </a:r>
+            <a:r>
+              <a:rPr lang="da-DK" sz="1000" b="1">
+                <a:solidFill>
+                  <a:srgbClr val="0070C0"/>
+                </a:solidFill>
+                <a:latin typeface="Consolas" panose="020B0609020204030204" pitchFamily="49" charset="0"/>
+              </a:rPr>
+              <a:t>string</a:t>
+            </a:r>
+            <a:r>
+              <a:rPr lang="da-DK" sz="1000" b="1">
+                <a:latin typeface="Consolas" panose="020B0609020204030204" pitchFamily="49" charset="0"/>
+              </a:rPr>
+              <a:t> brand, </a:t>
+            </a:r>
+            <a:r>
+              <a:rPr lang="da-DK" sz="1000" b="1">
+                <a:solidFill>
+                  <a:srgbClr val="0070C0"/>
+                </a:solidFill>
+                <a:latin typeface="Consolas" panose="020B0609020204030204" pitchFamily="49" charset="0"/>
+              </a:rPr>
+              <a:t>string</a:t>
+            </a:r>
+            <a:r>
+              <a:rPr lang="da-DK" sz="1000" b="1">
+                <a:latin typeface="Consolas" panose="020B0609020204030204" pitchFamily="49" charset="0"/>
+              </a:rPr>
+              <a:t> model, </a:t>
+            </a:r>
+            <a:r>
+              <a:rPr lang="da-DK" sz="1000" b="1">
+                <a:solidFill>
+                  <a:srgbClr val="0070C0"/>
+                </a:solidFill>
+                <a:latin typeface="Consolas" panose="020B0609020204030204" pitchFamily="49" charset="0"/>
+              </a:rPr>
+              <a:t>int</a:t>
+            </a:r>
+            <a:r>
+              <a:rPr lang="da-DK" sz="1000" b="1">
+                <a:latin typeface="Consolas" panose="020B0609020204030204" pitchFamily="49" charset="0"/>
+              </a:rPr>
+              <a:t> price)</a:t>
+            </a:r>
+          </a:p>
+          <a:p>
+            <a:r>
+              <a:rPr lang="da-DK" sz="1000" b="1">
+                <a:latin typeface="Consolas" panose="020B0609020204030204" pitchFamily="49" charset="0"/>
+              </a:rPr>
+              <a:t>    {</a:t>
+            </a:r>
+          </a:p>
+          <a:p>
+            <a:r>
+              <a:rPr lang="da-DK" sz="1000" b="1">
+                <a:latin typeface="Consolas" panose="020B0609020204030204" pitchFamily="49" charset="0"/>
+              </a:rPr>
+              <a:t>        _licensePlate = licensePlate;</a:t>
+            </a:r>
+          </a:p>
+          <a:p>
+            <a:r>
+              <a:rPr lang="da-DK" sz="1000" b="1">
+                <a:latin typeface="Consolas" panose="020B0609020204030204" pitchFamily="49" charset="0"/>
+              </a:rPr>
+              <a:t>        _brand = brand;</a:t>
+            </a:r>
+          </a:p>
+          <a:p>
+            <a:r>
+              <a:rPr lang="da-DK" sz="1000" b="1">
+                <a:latin typeface="Consolas" panose="020B0609020204030204" pitchFamily="49" charset="0"/>
+              </a:rPr>
+              <a:t>        _model = model;</a:t>
+            </a:r>
+          </a:p>
+          <a:p>
+            <a:r>
+              <a:rPr lang="da-DK" sz="1000" b="1">
+                <a:latin typeface="Consolas" panose="020B0609020204030204" pitchFamily="49" charset="0"/>
+              </a:rPr>
+              <a:t>        _price = price;</a:t>
+            </a:r>
+          </a:p>
+          <a:p>
+            <a:r>
+              <a:rPr lang="da-DK" sz="1000" b="1">
+                <a:latin typeface="Consolas" panose="020B0609020204030204" pitchFamily="49" charset="0"/>
+              </a:rPr>
+              <a:t>    }</a:t>
+            </a:r>
+          </a:p>
+          <a:p>
+            <a:endParaRPr lang="da-DK" sz="1000" b="1">
+              <a:latin typeface="Consolas" panose="020B0609020204030204" pitchFamily="49" charset="0"/>
+            </a:endParaRPr>
+          </a:p>
+          <a:p>
+            <a:r>
+              <a:rPr lang="da-DK" sz="1000" b="1">
+                <a:solidFill>
+                  <a:srgbClr val="0070C0"/>
+                </a:solidFill>
+                <a:latin typeface="Consolas" panose="020B0609020204030204" pitchFamily="49" charset="0"/>
+              </a:rPr>
+              <a:t>    public int</a:t>
+            </a:r>
+            <a:r>
+              <a:rPr lang="da-DK" sz="1000" b="1">
+                <a:latin typeface="Consolas" panose="020B0609020204030204" pitchFamily="49" charset="0"/>
+              </a:rPr>
+              <a:t> Price</a:t>
+            </a:r>
+          </a:p>
+          <a:p>
+            <a:r>
+              <a:rPr lang="da-DK" sz="1000" b="1">
+                <a:latin typeface="Consolas" panose="020B0609020204030204" pitchFamily="49" charset="0"/>
+              </a:rPr>
+              <a:t>    {</a:t>
+            </a:r>
+          </a:p>
+          <a:p>
+            <a:r>
+              <a:rPr lang="da-DK" sz="1000" b="1">
+                <a:latin typeface="Consolas" panose="020B0609020204030204" pitchFamily="49" charset="0"/>
+              </a:rPr>
+              <a:t>        </a:t>
+            </a:r>
+            <a:r>
+              <a:rPr lang="da-DK" sz="1000" b="1">
+                <a:solidFill>
+                  <a:srgbClr val="0070C0"/>
+                </a:solidFill>
+                <a:latin typeface="Consolas" panose="020B0609020204030204" pitchFamily="49" charset="0"/>
+              </a:rPr>
+              <a:t>get </a:t>
+            </a:r>
+            <a:r>
+              <a:rPr lang="da-DK" sz="1000" b="1">
+                <a:latin typeface="Consolas" panose="020B0609020204030204" pitchFamily="49" charset="0"/>
+              </a:rPr>
+              <a:t>{ </a:t>
+            </a:r>
+            <a:r>
+              <a:rPr lang="da-DK" sz="1000" b="1">
+                <a:solidFill>
+                  <a:srgbClr val="0070C0"/>
+                </a:solidFill>
+                <a:latin typeface="Consolas" panose="020B0609020204030204" pitchFamily="49" charset="0"/>
+              </a:rPr>
+              <a:t>return</a:t>
+            </a:r>
+            <a:r>
+              <a:rPr lang="da-DK" sz="1000" b="1">
+                <a:latin typeface="Consolas" panose="020B0609020204030204" pitchFamily="49" charset="0"/>
+              </a:rPr>
+              <a:t> _price; }</a:t>
+            </a:r>
+          </a:p>
+          <a:p>
+            <a:r>
+              <a:rPr lang="da-DK" sz="1000" b="1">
+                <a:latin typeface="Consolas" panose="020B0609020204030204" pitchFamily="49" charset="0"/>
+              </a:rPr>
+              <a:t>        </a:t>
+            </a:r>
+            <a:r>
+              <a:rPr lang="da-DK" sz="1000" b="1">
+                <a:solidFill>
+                  <a:srgbClr val="0070C0"/>
+                </a:solidFill>
+                <a:latin typeface="Consolas" panose="020B0609020204030204" pitchFamily="49" charset="0"/>
+              </a:rPr>
+              <a:t>set </a:t>
+            </a:r>
+            <a:r>
+              <a:rPr lang="da-DK" sz="1000" b="1">
+                <a:latin typeface="Consolas" panose="020B0609020204030204" pitchFamily="49" charset="0"/>
+              </a:rPr>
+              <a:t>{ _price = </a:t>
+            </a:r>
+            <a:r>
+              <a:rPr lang="da-DK" sz="1000" b="1">
+                <a:solidFill>
+                  <a:srgbClr val="0070C0"/>
+                </a:solidFill>
+                <a:latin typeface="Consolas" panose="020B0609020204030204" pitchFamily="49" charset="0"/>
+              </a:rPr>
+              <a:t>value</a:t>
+            </a:r>
+            <a:r>
+              <a:rPr lang="da-DK" sz="1000" b="1">
+                <a:latin typeface="Consolas" panose="020B0609020204030204" pitchFamily="49" charset="0"/>
+              </a:rPr>
+              <a:t>; }</a:t>
+            </a:r>
+          </a:p>
+          <a:p>
+            <a:r>
+              <a:rPr lang="da-DK" sz="1000" b="1">
+                <a:latin typeface="Consolas" panose="020B0609020204030204" pitchFamily="49" charset="0"/>
+              </a:rPr>
+              <a:t>    }</a:t>
+            </a:r>
+          </a:p>
+          <a:p>
+            <a:endParaRPr lang="da-DK" sz="1000" b="1">
+              <a:latin typeface="Consolas" panose="020B0609020204030204" pitchFamily="49" charset="0"/>
+            </a:endParaRPr>
+          </a:p>
+          <a:p>
+            <a:r>
+              <a:rPr lang="da-DK" sz="1000" b="1">
+                <a:solidFill>
+                  <a:srgbClr val="0070C0"/>
+                </a:solidFill>
+                <a:latin typeface="Consolas" panose="020B0609020204030204" pitchFamily="49" charset="0"/>
+              </a:rPr>
+              <a:t>    public string</a:t>
+            </a:r>
+            <a:r>
+              <a:rPr lang="da-DK" sz="1000" b="1">
+                <a:latin typeface="Consolas" panose="020B0609020204030204" pitchFamily="49" charset="0"/>
+              </a:rPr>
+              <a:t> LicensePlate</a:t>
+            </a:r>
+          </a:p>
+          <a:p>
+            <a:r>
+              <a:rPr lang="da-DK" sz="1000" b="1">
+                <a:latin typeface="Consolas" panose="020B0609020204030204" pitchFamily="49" charset="0"/>
+              </a:rPr>
+              <a:t>    {</a:t>
+            </a:r>
+          </a:p>
+          <a:p>
+            <a:r>
+              <a:rPr lang="da-DK" sz="1000" b="1">
+                <a:latin typeface="Consolas" panose="020B0609020204030204" pitchFamily="49" charset="0"/>
+              </a:rPr>
+              <a:t>        </a:t>
+            </a:r>
+            <a:r>
+              <a:rPr lang="da-DK" sz="1000" b="1">
+                <a:solidFill>
+                  <a:srgbClr val="0070C0"/>
+                </a:solidFill>
+                <a:latin typeface="Consolas" panose="020B0609020204030204" pitchFamily="49" charset="0"/>
+              </a:rPr>
+              <a:t>get </a:t>
+            </a:r>
+            <a:r>
+              <a:rPr lang="da-DK" sz="1000" b="1">
+                <a:latin typeface="Consolas" panose="020B0609020204030204" pitchFamily="49" charset="0"/>
+              </a:rPr>
+              <a:t>{ </a:t>
+            </a:r>
+            <a:r>
+              <a:rPr lang="da-DK" sz="1000" b="1">
+                <a:solidFill>
+                  <a:srgbClr val="0070C0"/>
+                </a:solidFill>
+                <a:latin typeface="Consolas" panose="020B0609020204030204" pitchFamily="49" charset="0"/>
+              </a:rPr>
+              <a:t>return</a:t>
+            </a:r>
+            <a:r>
+              <a:rPr lang="da-DK" sz="1000" b="1">
+                <a:latin typeface="Consolas" panose="020B0609020204030204" pitchFamily="49" charset="0"/>
+              </a:rPr>
+              <a:t> _ licensePlate; }</a:t>
+            </a:r>
+          </a:p>
+          <a:p>
+            <a:r>
+              <a:rPr lang="da-DK" sz="1000" b="1">
+                <a:latin typeface="Consolas" panose="020B0609020204030204" pitchFamily="49" charset="0"/>
+              </a:rPr>
+              <a:t>    }</a:t>
+            </a:r>
+          </a:p>
+          <a:p>
+            <a:endParaRPr lang="da-DK" sz="1000" b="1">
+              <a:latin typeface="Consolas" panose="020B0609020204030204" pitchFamily="49" charset="0"/>
+            </a:endParaRPr>
+          </a:p>
+          <a:p>
+            <a:r>
+              <a:rPr lang="da-DK" sz="1000" b="1">
+                <a:latin typeface="Consolas" panose="020B0609020204030204" pitchFamily="49" charset="0"/>
+              </a:rPr>
+              <a:t>    …</a:t>
+            </a:r>
+          </a:p>
+          <a:p>
+            <a:endParaRPr lang="da-DK" sz="1000" b="1">
+              <a:latin typeface="Consolas" panose="020B0609020204030204" pitchFamily="49" charset="0"/>
+            </a:endParaRPr>
+          </a:p>
+          <a:p>
+            <a:r>
+              <a:rPr lang="da-DK" sz="1000" b="1">
+                <a:solidFill>
+                  <a:srgbClr val="0070C0"/>
+                </a:solidFill>
+                <a:latin typeface="Consolas" panose="020B0609020204030204" pitchFamily="49" charset="0"/>
+              </a:rPr>
+              <a:t>    public void</a:t>
+            </a:r>
+            <a:r>
+              <a:rPr lang="da-DK" sz="1000" b="1">
+                <a:latin typeface="Consolas" panose="020B0609020204030204" pitchFamily="49" charset="0"/>
+              </a:rPr>
+              <a:t> PrintSummary(</a:t>
+            </a:r>
+            <a:r>
+              <a:rPr lang="da-DK" sz="1000" b="1">
+                <a:solidFill>
+                  <a:srgbClr val="0070C0"/>
+                </a:solidFill>
+                <a:latin typeface="Consolas" panose="020B0609020204030204" pitchFamily="49" charset="0"/>
+              </a:rPr>
+              <a:t>string</a:t>
+            </a:r>
+            <a:r>
+              <a:rPr lang="da-DK" sz="1000" b="1">
+                <a:latin typeface="Consolas" panose="020B0609020204030204" pitchFamily="49" charset="0"/>
+              </a:rPr>
+              <a:t> header)</a:t>
+            </a:r>
+          </a:p>
+          <a:p>
+            <a:r>
+              <a:rPr lang="da-DK" sz="1000" b="1">
+                <a:latin typeface="Consolas" panose="020B0609020204030204" pitchFamily="49" charset="0"/>
+              </a:rPr>
+              <a:t>    {</a:t>
+            </a:r>
+          </a:p>
+          <a:p>
+            <a:r>
+              <a:rPr lang="da-DK" sz="1000" b="1">
+                <a:latin typeface="Consolas" panose="020B0609020204030204" pitchFamily="49" charset="0"/>
+              </a:rPr>
+              <a:t>        …</a:t>
+            </a:r>
+          </a:p>
+          <a:p>
+            <a:r>
+              <a:rPr lang="da-DK" sz="1000" b="1">
+                <a:latin typeface="Consolas" panose="020B0609020204030204" pitchFamily="49" charset="0"/>
+              </a:rPr>
+              <a:t>    }</a:t>
+            </a:r>
+          </a:p>
+          <a:p>
+            <a:endParaRPr lang="da-DK" sz="1000" b="1">
+              <a:latin typeface="Consolas" panose="020B0609020204030204" pitchFamily="49" charset="0"/>
+            </a:endParaRPr>
+          </a:p>
+          <a:p>
+            <a:r>
+              <a:rPr lang="da-DK" sz="1000" b="1">
+                <a:latin typeface="Consolas" panose="020B0609020204030204" pitchFamily="49" charset="0"/>
+              </a:rPr>
+              <a:t>    …</a:t>
+            </a:r>
+          </a:p>
+          <a:p>
+            <a:r>
+              <a:rPr lang="da-DK" sz="1000" b="1">
+                <a:latin typeface="Consolas" panose="020B0609020204030204" pitchFamily="49" charset="0"/>
+              </a:rPr>
+              <a:t>}</a:t>
+            </a:r>
+          </a:p>
+        </p:txBody>
+      </p:sp>
+    </p:spTree>
+    <p:extLst>
+      <p:ext uri="{BB962C8B-B14F-4D97-AF65-F5344CB8AC3E}">
+        <p14:creationId xmlns:p14="http://schemas.microsoft.com/office/powerpoint/2010/main" val="3500999149"/>
+      </p:ext>
+    </p:extLst>
+  </p:cSld>
+  <p:clrMapOvr>
+    <a:masterClrMapping/>
+  </p:clrMapOvr>
+  <mc:AlternateContent xmlns:mc="http://schemas.openxmlformats.org/markup-compatibility/2006">
+    <mc:Choice xmlns:p14="http://schemas.microsoft.com/office/powerpoint/2010/main" Requires="p14">
+      <p:transition spd="med" p14:dur="700">
+        <p:fade/>
+      </p:transition>
+    </mc:Choice>
+    <mc:Fallback>
+      <p:transition spd="med">
+        <p:fade/>
+      </p:transition>
+    </mc:Fallback>
+  </mc:AlternateContent>
+</p:sld>
+</file>
+
+<file path=ppt/slides/slide41.xml><?xml version="1.0" encoding="utf-8"?>
+<p:sld xmlns:a="http://schemas.openxmlformats.org/drawingml/2006/main" xmlns:r="http://schemas.openxmlformats.org/officeDocument/2006/relationships" xmlns:p="http://schemas.openxmlformats.org/presentationml/2006/main">
+  <p:cSld>
+    <p:spTree>
+      <p:nvGrpSpPr>
+        <p:cNvPr id="1" name=""/>
+        <p:cNvGrpSpPr/>
+        <p:nvPr/>
+      </p:nvGrpSpPr>
+      <p:grpSpPr>
+        <a:xfrm>
+          <a:off x="0" y="0"/>
+          <a:ext cx="0" cy="0"/>
+          <a:chOff x="0" y="0"/>
+          <a:chExt cx="0" cy="0"/>
+        </a:xfrm>
+      </p:grpSpPr>
+      <p:sp>
+        <p:nvSpPr>
+          <p:cNvPr id="2" name="Tekstfelt 1"/>
+          <p:cNvSpPr txBox="1"/>
+          <p:nvPr/>
+        </p:nvSpPr>
+        <p:spPr>
+          <a:xfrm>
+            <a:off x="920416" y="672345"/>
+            <a:ext cx="9849626" cy="4832092"/>
+          </a:xfrm>
+          <a:prstGeom prst="rect">
+            <a:avLst/>
+          </a:prstGeom>
+          <a:noFill/>
+        </p:spPr>
+        <p:txBody>
+          <a:bodyPr wrap="square" rtlCol="0">
+            <a:spAutoFit/>
+          </a:bodyPr>
+          <a:lstStyle/>
+          <a:p>
+            <a:r>
+              <a:rPr lang="da-DK" sz="1400" b="1" dirty="0">
+                <a:solidFill>
+                  <a:srgbClr val="0070C0"/>
+                </a:solidFill>
+                <a:latin typeface="Consolas" panose="020B0609020204030204" pitchFamily="49" charset="0"/>
+              </a:rPr>
+              <a:t>public class</a:t>
+            </a:r>
+            <a:r>
+              <a:rPr lang="da-DK" sz="1400" b="1" dirty="0">
+                <a:latin typeface="Consolas" panose="020B0609020204030204" pitchFamily="49" charset="0"/>
+              </a:rPr>
+              <a:t> Car</a:t>
+            </a:r>
+          </a:p>
+          <a:p>
+            <a:r>
+              <a:rPr lang="da-DK" sz="1400" b="1" dirty="0">
+                <a:latin typeface="Consolas" panose="020B0609020204030204" pitchFamily="49" charset="0"/>
+              </a:rPr>
+              <a:t>{</a:t>
+            </a:r>
+          </a:p>
+          <a:p>
+            <a:r>
+              <a:rPr lang="da-DK" sz="1400" b="1" dirty="0">
+                <a:solidFill>
+                  <a:srgbClr val="0070C0"/>
+                </a:solidFill>
+                <a:latin typeface="Consolas" panose="020B0609020204030204" pitchFamily="49" charset="0"/>
+              </a:rPr>
+              <a:t>    public </a:t>
+            </a:r>
+            <a:r>
+              <a:rPr lang="da-DK" sz="1400" b="1" dirty="0">
+                <a:latin typeface="Consolas" panose="020B0609020204030204" pitchFamily="49" charset="0"/>
+              </a:rPr>
+              <a:t>Car(</a:t>
+            </a:r>
+            <a:r>
+              <a:rPr lang="da-DK" sz="1400" b="1" dirty="0" err="1">
+                <a:solidFill>
+                  <a:srgbClr val="0070C0"/>
+                </a:solidFill>
+                <a:latin typeface="Consolas" panose="020B0609020204030204" pitchFamily="49" charset="0"/>
+              </a:rPr>
+              <a:t>string</a:t>
+            </a:r>
+            <a:r>
+              <a:rPr lang="da-DK" sz="1400" b="1" dirty="0">
+                <a:latin typeface="Consolas" panose="020B0609020204030204" pitchFamily="49" charset="0"/>
+              </a:rPr>
+              <a:t> </a:t>
+            </a:r>
+            <a:r>
+              <a:rPr lang="da-DK" sz="1400" b="1" dirty="0" err="1">
+                <a:latin typeface="Consolas" panose="020B0609020204030204" pitchFamily="49" charset="0"/>
+              </a:rPr>
+              <a:t>licensePlate</a:t>
+            </a:r>
+            <a:r>
+              <a:rPr lang="da-DK" sz="1400" b="1" dirty="0">
+                <a:latin typeface="Consolas" panose="020B0609020204030204" pitchFamily="49" charset="0"/>
+              </a:rPr>
+              <a:t>, </a:t>
+            </a:r>
+            <a:r>
+              <a:rPr lang="da-DK" sz="1400" b="1" dirty="0" err="1">
+                <a:solidFill>
+                  <a:srgbClr val="0070C0"/>
+                </a:solidFill>
+                <a:latin typeface="Consolas" panose="020B0609020204030204" pitchFamily="49" charset="0"/>
+              </a:rPr>
+              <a:t>string</a:t>
+            </a:r>
+            <a:r>
+              <a:rPr lang="da-DK" sz="1400" b="1" dirty="0">
+                <a:latin typeface="Consolas" panose="020B0609020204030204" pitchFamily="49" charset="0"/>
+              </a:rPr>
+              <a:t> brand, </a:t>
+            </a:r>
+            <a:r>
+              <a:rPr lang="da-DK" sz="1400" b="1" dirty="0" err="1">
+                <a:solidFill>
+                  <a:srgbClr val="0070C0"/>
+                </a:solidFill>
+                <a:latin typeface="Consolas" panose="020B0609020204030204" pitchFamily="49" charset="0"/>
+              </a:rPr>
+              <a:t>string</a:t>
+            </a:r>
+            <a:r>
+              <a:rPr lang="da-DK" sz="1400" b="1" dirty="0">
+                <a:latin typeface="Consolas" panose="020B0609020204030204" pitchFamily="49" charset="0"/>
+              </a:rPr>
+              <a:t> model, </a:t>
+            </a:r>
+            <a:r>
+              <a:rPr lang="da-DK" sz="1400" b="1" dirty="0">
+                <a:solidFill>
+                  <a:srgbClr val="0070C0"/>
+                </a:solidFill>
+                <a:latin typeface="Consolas" panose="020B0609020204030204" pitchFamily="49" charset="0"/>
+              </a:rPr>
+              <a:t>int</a:t>
+            </a:r>
+            <a:r>
+              <a:rPr lang="da-DK" sz="1400" b="1" dirty="0">
+                <a:latin typeface="Consolas" panose="020B0609020204030204" pitchFamily="49" charset="0"/>
+              </a:rPr>
+              <a:t> </a:t>
+            </a:r>
+            <a:r>
+              <a:rPr lang="da-DK" sz="1400" b="1" dirty="0" err="1">
+                <a:latin typeface="Consolas" panose="020B0609020204030204" pitchFamily="49" charset="0"/>
+              </a:rPr>
+              <a:t>price</a:t>
+            </a:r>
+            <a:r>
+              <a:rPr lang="da-DK" sz="1400" b="1" dirty="0">
+                <a:latin typeface="Consolas" panose="020B0609020204030204" pitchFamily="49" charset="0"/>
+              </a:rPr>
+              <a:t>)</a:t>
+            </a:r>
+          </a:p>
+          <a:p>
+            <a:r>
+              <a:rPr lang="da-DK" sz="1400" b="1" dirty="0">
+                <a:latin typeface="Consolas" panose="020B0609020204030204" pitchFamily="49" charset="0"/>
+              </a:rPr>
+              <a:t>    {</a:t>
+            </a:r>
+          </a:p>
+          <a:p>
+            <a:r>
+              <a:rPr lang="da-DK" sz="1400" b="1" dirty="0">
+                <a:latin typeface="Consolas" panose="020B0609020204030204" pitchFamily="49" charset="0"/>
+              </a:rPr>
+              <a:t>        </a:t>
+            </a:r>
+            <a:r>
+              <a:rPr lang="da-DK" sz="1400" b="1" dirty="0" err="1">
+                <a:latin typeface="Consolas" panose="020B0609020204030204" pitchFamily="49" charset="0"/>
+              </a:rPr>
+              <a:t>LicensePlate</a:t>
+            </a:r>
+            <a:r>
+              <a:rPr lang="da-DK" sz="1400" b="1" dirty="0">
+                <a:latin typeface="Consolas" panose="020B0609020204030204" pitchFamily="49" charset="0"/>
+              </a:rPr>
+              <a:t> = </a:t>
+            </a:r>
+            <a:r>
+              <a:rPr lang="da-DK" sz="1400" b="1" dirty="0" err="1">
+                <a:latin typeface="Consolas" panose="020B0609020204030204" pitchFamily="49" charset="0"/>
+              </a:rPr>
+              <a:t>licensePlate</a:t>
+            </a:r>
+            <a:r>
+              <a:rPr lang="da-DK" sz="1400" b="1" dirty="0">
+                <a:latin typeface="Consolas" panose="020B0609020204030204" pitchFamily="49" charset="0"/>
+              </a:rPr>
+              <a:t>;</a:t>
+            </a:r>
+          </a:p>
+          <a:p>
+            <a:r>
+              <a:rPr lang="da-DK" sz="1400" b="1" dirty="0">
+                <a:latin typeface="Consolas" panose="020B0609020204030204" pitchFamily="49" charset="0"/>
+              </a:rPr>
+              <a:t>        Brand = brand;</a:t>
+            </a:r>
+          </a:p>
+          <a:p>
+            <a:r>
+              <a:rPr lang="da-DK" sz="1400" b="1" dirty="0">
+                <a:latin typeface="Consolas" panose="020B0609020204030204" pitchFamily="49" charset="0"/>
+              </a:rPr>
+              <a:t>        Model = model;</a:t>
+            </a:r>
+          </a:p>
+          <a:p>
+            <a:r>
+              <a:rPr lang="da-DK" sz="1400" b="1" dirty="0">
+                <a:latin typeface="Consolas" panose="020B0609020204030204" pitchFamily="49" charset="0"/>
+              </a:rPr>
+              <a:t>        Price = </a:t>
+            </a:r>
+            <a:r>
+              <a:rPr lang="da-DK" sz="1400" b="1" dirty="0" err="1">
+                <a:latin typeface="Consolas" panose="020B0609020204030204" pitchFamily="49" charset="0"/>
+              </a:rPr>
+              <a:t>price</a:t>
+            </a:r>
+            <a:r>
+              <a:rPr lang="da-DK" sz="1400" b="1" dirty="0">
+                <a:latin typeface="Consolas" panose="020B0609020204030204" pitchFamily="49" charset="0"/>
+              </a:rPr>
+              <a:t>;</a:t>
+            </a:r>
+          </a:p>
+          <a:p>
+            <a:r>
+              <a:rPr lang="da-DK" sz="1400" b="1" dirty="0">
+                <a:latin typeface="Consolas" panose="020B0609020204030204" pitchFamily="49" charset="0"/>
+              </a:rPr>
+              <a:t>    }</a:t>
+            </a:r>
+          </a:p>
+          <a:p>
+            <a:endParaRPr lang="da-DK" sz="1400" b="1" dirty="0">
+              <a:latin typeface="Consolas" panose="020B0609020204030204" pitchFamily="49" charset="0"/>
+            </a:endParaRPr>
+          </a:p>
+          <a:p>
+            <a:r>
+              <a:rPr lang="da-DK" sz="1400" b="1" dirty="0">
+                <a:solidFill>
+                  <a:srgbClr val="0070C0"/>
+                </a:solidFill>
+                <a:latin typeface="Consolas" panose="020B0609020204030204" pitchFamily="49" charset="0"/>
+              </a:rPr>
+              <a:t>    public int</a:t>
+            </a:r>
+            <a:r>
+              <a:rPr lang="da-DK" sz="1400" b="1" dirty="0">
+                <a:latin typeface="Consolas" panose="020B0609020204030204" pitchFamily="49" charset="0"/>
+              </a:rPr>
+              <a:t> </a:t>
+            </a:r>
+            <a:r>
+              <a:rPr lang="da-DK" sz="1400" b="1" dirty="0" err="1">
+                <a:latin typeface="Consolas" panose="020B0609020204030204" pitchFamily="49" charset="0"/>
+              </a:rPr>
+              <a:t>LicensePlate</a:t>
+            </a:r>
+            <a:r>
+              <a:rPr lang="da-DK" sz="1400" b="1" dirty="0">
+                <a:latin typeface="Consolas" panose="020B0609020204030204" pitchFamily="49" charset="0"/>
+              </a:rPr>
+              <a:t> { </a:t>
+            </a:r>
+            <a:r>
+              <a:rPr lang="da-DK" sz="1400" b="1" dirty="0" err="1">
+                <a:solidFill>
+                  <a:srgbClr val="0070C0"/>
+                </a:solidFill>
+                <a:latin typeface="Consolas" panose="020B0609020204030204" pitchFamily="49" charset="0"/>
+              </a:rPr>
+              <a:t>get</a:t>
+            </a:r>
+            <a:r>
+              <a:rPr lang="da-DK" sz="1400" b="1" dirty="0">
+                <a:latin typeface="Consolas" panose="020B0609020204030204" pitchFamily="49" charset="0"/>
+              </a:rPr>
+              <a:t>; }</a:t>
+            </a:r>
+          </a:p>
+          <a:p>
+            <a:r>
+              <a:rPr lang="da-DK" sz="1400" b="1" dirty="0">
+                <a:solidFill>
+                  <a:srgbClr val="0070C0"/>
+                </a:solidFill>
+                <a:latin typeface="Consolas" panose="020B0609020204030204" pitchFamily="49" charset="0"/>
+              </a:rPr>
+              <a:t>    public int</a:t>
+            </a:r>
+            <a:r>
+              <a:rPr lang="da-DK" sz="1400" b="1" dirty="0">
+                <a:latin typeface="Consolas" panose="020B0609020204030204" pitchFamily="49" charset="0"/>
+              </a:rPr>
+              <a:t> Brand { </a:t>
+            </a:r>
+            <a:r>
+              <a:rPr lang="da-DK" sz="1400" b="1" dirty="0" err="1">
+                <a:solidFill>
+                  <a:srgbClr val="0070C0"/>
+                </a:solidFill>
+                <a:latin typeface="Consolas" panose="020B0609020204030204" pitchFamily="49" charset="0"/>
+              </a:rPr>
+              <a:t>get</a:t>
+            </a:r>
+            <a:r>
+              <a:rPr lang="da-DK" sz="1400" b="1" dirty="0">
+                <a:latin typeface="Consolas" panose="020B0609020204030204" pitchFamily="49" charset="0"/>
+              </a:rPr>
+              <a:t>; }</a:t>
+            </a:r>
+          </a:p>
+          <a:p>
+            <a:r>
+              <a:rPr lang="da-DK" sz="1400" b="1" dirty="0">
+                <a:solidFill>
+                  <a:srgbClr val="0070C0"/>
+                </a:solidFill>
+                <a:latin typeface="Consolas" panose="020B0609020204030204" pitchFamily="49" charset="0"/>
+              </a:rPr>
+              <a:t>    public int</a:t>
+            </a:r>
+            <a:r>
+              <a:rPr lang="da-DK" sz="1400" b="1" dirty="0">
+                <a:latin typeface="Consolas" panose="020B0609020204030204" pitchFamily="49" charset="0"/>
+              </a:rPr>
+              <a:t> Model { </a:t>
+            </a:r>
+            <a:r>
+              <a:rPr lang="da-DK" sz="1400" b="1" dirty="0" err="1">
+                <a:solidFill>
+                  <a:srgbClr val="0070C0"/>
+                </a:solidFill>
+                <a:latin typeface="Consolas" panose="020B0609020204030204" pitchFamily="49" charset="0"/>
+              </a:rPr>
+              <a:t>get</a:t>
+            </a:r>
+            <a:r>
+              <a:rPr lang="da-DK" sz="1400" b="1" dirty="0">
+                <a:latin typeface="Consolas" panose="020B0609020204030204" pitchFamily="49" charset="0"/>
+              </a:rPr>
+              <a:t>; }</a:t>
+            </a:r>
+          </a:p>
+          <a:p>
+            <a:r>
+              <a:rPr lang="da-DK" sz="1400" b="1" dirty="0">
+                <a:solidFill>
+                  <a:srgbClr val="0070C0"/>
+                </a:solidFill>
+                <a:latin typeface="Consolas" panose="020B0609020204030204" pitchFamily="49" charset="0"/>
+              </a:rPr>
+              <a:t>    public int</a:t>
+            </a:r>
+            <a:r>
+              <a:rPr lang="da-DK" sz="1400" b="1" dirty="0">
+                <a:latin typeface="Consolas" panose="020B0609020204030204" pitchFamily="49" charset="0"/>
+              </a:rPr>
+              <a:t> Price { </a:t>
+            </a:r>
+            <a:r>
+              <a:rPr lang="da-DK" sz="1400" b="1" dirty="0" err="1">
+                <a:solidFill>
+                  <a:srgbClr val="0070C0"/>
+                </a:solidFill>
+                <a:latin typeface="Consolas" panose="020B0609020204030204" pitchFamily="49" charset="0"/>
+              </a:rPr>
+              <a:t>get</a:t>
+            </a:r>
+            <a:r>
+              <a:rPr lang="da-DK" sz="1400" b="1" dirty="0">
+                <a:latin typeface="Consolas" panose="020B0609020204030204" pitchFamily="49" charset="0"/>
+              </a:rPr>
+              <a:t>;</a:t>
+            </a:r>
+            <a:r>
+              <a:rPr lang="da-DK" sz="1400" b="1" dirty="0">
+                <a:solidFill>
+                  <a:srgbClr val="0070C0"/>
+                </a:solidFill>
+                <a:latin typeface="Consolas" panose="020B0609020204030204" pitchFamily="49" charset="0"/>
+              </a:rPr>
+              <a:t> set</a:t>
+            </a:r>
+            <a:r>
+              <a:rPr lang="da-DK" sz="1400" b="1" dirty="0">
+                <a:latin typeface="Consolas" panose="020B0609020204030204" pitchFamily="49" charset="0"/>
+              </a:rPr>
+              <a:t>;</a:t>
+            </a:r>
+            <a:r>
+              <a:rPr lang="da-DK" sz="1400" b="1" dirty="0">
+                <a:solidFill>
+                  <a:srgbClr val="0070C0"/>
+                </a:solidFill>
+                <a:latin typeface="Consolas" panose="020B0609020204030204" pitchFamily="49" charset="0"/>
+              </a:rPr>
+              <a:t> </a:t>
+            </a:r>
+            <a:r>
+              <a:rPr lang="da-DK" sz="1400" b="1" dirty="0">
+                <a:latin typeface="Consolas" panose="020B0609020204030204" pitchFamily="49" charset="0"/>
+              </a:rPr>
+              <a:t>}</a:t>
+            </a:r>
+          </a:p>
+          <a:p>
+            <a:endParaRPr lang="da-DK" sz="1400" b="1" dirty="0">
+              <a:latin typeface="Consolas" panose="020B0609020204030204" pitchFamily="49" charset="0"/>
+            </a:endParaRPr>
+          </a:p>
+          <a:p>
+            <a:r>
+              <a:rPr lang="da-DK" sz="1400" b="1" dirty="0">
+                <a:solidFill>
+                  <a:srgbClr val="0070C0"/>
+                </a:solidFill>
+                <a:latin typeface="Consolas" panose="020B0609020204030204" pitchFamily="49" charset="0"/>
+              </a:rPr>
+              <a:t>    public </a:t>
+            </a:r>
+            <a:r>
+              <a:rPr lang="da-DK" sz="1400" b="1" dirty="0" err="1">
+                <a:solidFill>
+                  <a:srgbClr val="0070C0"/>
+                </a:solidFill>
+                <a:latin typeface="Consolas" panose="020B0609020204030204" pitchFamily="49" charset="0"/>
+              </a:rPr>
+              <a:t>void</a:t>
+            </a:r>
+            <a:r>
+              <a:rPr lang="da-DK" sz="1400" b="1" dirty="0">
+                <a:latin typeface="Consolas" panose="020B0609020204030204" pitchFamily="49" charset="0"/>
+              </a:rPr>
+              <a:t> </a:t>
+            </a:r>
+            <a:r>
+              <a:rPr lang="da-DK" sz="1400" b="1" dirty="0" err="1">
+                <a:latin typeface="Consolas" panose="020B0609020204030204" pitchFamily="49" charset="0"/>
+              </a:rPr>
+              <a:t>PrintSummary</a:t>
+            </a:r>
+            <a:r>
+              <a:rPr lang="da-DK" sz="1400" b="1" dirty="0">
+                <a:latin typeface="Consolas" panose="020B0609020204030204" pitchFamily="49" charset="0"/>
+              </a:rPr>
+              <a:t>(</a:t>
+            </a:r>
+            <a:r>
+              <a:rPr lang="da-DK" sz="1400" b="1" dirty="0" err="1">
+                <a:solidFill>
+                  <a:srgbClr val="0070C0"/>
+                </a:solidFill>
+                <a:latin typeface="Consolas" panose="020B0609020204030204" pitchFamily="49" charset="0"/>
+              </a:rPr>
+              <a:t>string</a:t>
+            </a:r>
+            <a:r>
+              <a:rPr lang="da-DK" sz="1400" b="1" dirty="0">
+                <a:latin typeface="Consolas" panose="020B0609020204030204" pitchFamily="49" charset="0"/>
+              </a:rPr>
+              <a:t> header)</a:t>
+            </a:r>
+          </a:p>
+          <a:p>
+            <a:r>
+              <a:rPr lang="da-DK" sz="1400" b="1" dirty="0">
+                <a:latin typeface="Consolas" panose="020B0609020204030204" pitchFamily="49" charset="0"/>
+              </a:rPr>
+              <a:t>    {</a:t>
+            </a:r>
+          </a:p>
+          <a:p>
+            <a:r>
+              <a:rPr lang="da-DK" sz="1400" b="1" dirty="0">
+                <a:latin typeface="Consolas" panose="020B0609020204030204" pitchFamily="49" charset="0"/>
+              </a:rPr>
+              <a:t>        …</a:t>
+            </a:r>
+          </a:p>
+          <a:p>
+            <a:r>
+              <a:rPr lang="da-DK" sz="1400" b="1" dirty="0">
+                <a:latin typeface="Consolas" panose="020B0609020204030204" pitchFamily="49" charset="0"/>
+              </a:rPr>
+              <a:t>    }</a:t>
+            </a:r>
+          </a:p>
+          <a:p>
+            <a:endParaRPr lang="da-DK" sz="1400" b="1" dirty="0">
+              <a:latin typeface="Consolas" panose="020B0609020204030204" pitchFamily="49" charset="0"/>
+            </a:endParaRPr>
+          </a:p>
+          <a:p>
+            <a:r>
+              <a:rPr lang="da-DK" sz="1400" b="1" dirty="0">
+                <a:latin typeface="Consolas" panose="020B0609020204030204" pitchFamily="49" charset="0"/>
+              </a:rPr>
+              <a:t>    …</a:t>
+            </a:r>
+          </a:p>
+          <a:p>
+            <a:r>
+              <a:rPr lang="da-DK" sz="1400" b="1" dirty="0">
+                <a:latin typeface="Consolas" panose="020B0609020204030204" pitchFamily="49" charset="0"/>
+              </a:rPr>
+              <a:t>}</a:t>
+            </a:r>
+          </a:p>
+        </p:txBody>
+      </p:sp>
+    </p:spTree>
+    <p:extLst>
+      <p:ext uri="{BB962C8B-B14F-4D97-AF65-F5344CB8AC3E}">
+        <p14:creationId xmlns:p14="http://schemas.microsoft.com/office/powerpoint/2010/main" val="1408177868"/>
+      </p:ext>
+    </p:extLst>
+  </p:cSld>
+  <p:clrMapOvr>
+    <a:masterClrMapping/>
+  </p:clrMapOvr>
+  <mc:AlternateContent xmlns:mc="http://schemas.openxmlformats.org/markup-compatibility/2006">
+    <mc:Choice xmlns:p14="http://schemas.microsoft.com/office/powerpoint/2010/main" Requires="p14">
+      <p:transition spd="med" p14:dur="700">
+        <p:fade/>
+      </p:transition>
+    </mc:Choice>
+    <mc:Fallback>
+      <p:transition spd="med">
+        <p:fade/>
+      </p:transition>
+    </mc:Fallback>
+  </mc:AlternateContent>
+</p:sld>
+</file>
+
+<file path=ppt/slides/slide42.xml><?xml version="1.0" encoding="utf-8"?>
+<p:sld xmlns:a="http://schemas.openxmlformats.org/drawingml/2006/main" xmlns:r="http://schemas.openxmlformats.org/officeDocument/2006/relationships" xmlns:p="http://schemas.openxmlformats.org/presentationml/2006/main">
+  <p:cSld>
+    <p:spTree>
+      <p:nvGrpSpPr>
+        <p:cNvPr id="1" name=""/>
+        <p:cNvGrpSpPr/>
+        <p:nvPr/>
+      </p:nvGrpSpPr>
+      <p:grpSpPr>
+        <a:xfrm>
+          <a:off x="0" y="0"/>
+          <a:ext cx="0" cy="0"/>
+          <a:chOff x="0" y="0"/>
+          <a:chExt cx="0" cy="0"/>
+        </a:xfrm>
+      </p:grpSpPr>
+      <p:sp>
+        <p:nvSpPr>
+          <p:cNvPr id="2" name="Tekstfelt 1"/>
+          <p:cNvSpPr txBox="1"/>
+          <p:nvPr/>
+        </p:nvSpPr>
+        <p:spPr>
+          <a:xfrm>
+            <a:off x="920415" y="672345"/>
+            <a:ext cx="10573195" cy="646331"/>
+          </a:xfrm>
+          <a:prstGeom prst="rect">
+            <a:avLst/>
+          </a:prstGeom>
+          <a:noFill/>
+        </p:spPr>
+        <p:txBody>
+          <a:bodyPr wrap="square" rtlCol="0">
+            <a:spAutoFit/>
+          </a:bodyPr>
+          <a:lstStyle/>
+          <a:p>
+            <a:r>
+              <a:rPr lang="da-DK" sz="3600" b="1" dirty="0">
+                <a:solidFill>
+                  <a:srgbClr val="0070C0"/>
+                </a:solidFill>
+                <a:latin typeface="Consolas" panose="020B0609020204030204" pitchFamily="49" charset="0"/>
+              </a:rPr>
+              <a:t>public int</a:t>
+            </a:r>
+            <a:r>
+              <a:rPr lang="da-DK" sz="3600" b="1" dirty="0">
+                <a:latin typeface="Consolas" panose="020B0609020204030204" pitchFamily="49" charset="0"/>
+              </a:rPr>
+              <a:t> Price { </a:t>
+            </a:r>
+            <a:r>
+              <a:rPr lang="da-DK" sz="3600" b="1" dirty="0" err="1">
+                <a:solidFill>
+                  <a:srgbClr val="0070C0"/>
+                </a:solidFill>
+                <a:latin typeface="Consolas" panose="020B0609020204030204" pitchFamily="49" charset="0"/>
+              </a:rPr>
+              <a:t>get</a:t>
+            </a:r>
+            <a:r>
+              <a:rPr lang="da-DK" sz="3600" b="1" dirty="0">
+                <a:latin typeface="Consolas" panose="020B0609020204030204" pitchFamily="49" charset="0"/>
+              </a:rPr>
+              <a:t>; </a:t>
+            </a:r>
+            <a:r>
+              <a:rPr lang="da-DK" sz="3600" b="1" dirty="0">
+                <a:solidFill>
+                  <a:srgbClr val="0070C0"/>
+                </a:solidFill>
+                <a:latin typeface="Consolas" panose="020B0609020204030204" pitchFamily="49" charset="0"/>
+              </a:rPr>
+              <a:t>private set</a:t>
+            </a:r>
+            <a:r>
+              <a:rPr lang="da-DK" sz="3600" b="1" dirty="0">
+                <a:latin typeface="Consolas" panose="020B0609020204030204" pitchFamily="49" charset="0"/>
+              </a:rPr>
+              <a:t>; }</a:t>
+            </a:r>
+          </a:p>
+        </p:txBody>
+      </p:sp>
+    </p:spTree>
+    <p:extLst>
+      <p:ext uri="{BB962C8B-B14F-4D97-AF65-F5344CB8AC3E}">
+        <p14:creationId xmlns:p14="http://schemas.microsoft.com/office/powerpoint/2010/main" val="3298411464"/>
+      </p:ext>
+    </p:extLst>
+  </p:cSld>
+  <p:clrMapOvr>
+    <a:masterClrMapping/>
+  </p:clrMapOvr>
+  <mc:AlternateContent xmlns:mc="http://schemas.openxmlformats.org/markup-compatibility/2006">
+    <mc:Choice xmlns:p14="http://schemas.microsoft.com/office/powerpoint/2010/main" Requires="p14">
+      <p:transition spd="med" p14:dur="700">
+        <p:fade/>
+      </p:transition>
+    </mc:Choice>
+    <mc:Fallback>
+      <p:transition spd="med">
+        <p:fade/>
+      </p:transition>
+    </mc:Fallback>
+  </mc:AlternateContent>
 </p:sld>
 </file>
 
@@ -12330,6 +14924,18 @@
   <p:clrMapOvr>
     <a:masterClrMapping/>
   </p:clrMapOvr>
+  <mc:AlternateContent xmlns:mc="http://schemas.openxmlformats.org/markup-compatibility/2006">
+    <mc:Choice xmlns:p14="http://schemas.microsoft.com/office/powerpoint/2010/main" Requires="p14">
+      <p:transition spd="med" p14:dur="700">
+        <p:fade/>
+      </p:transition>
+    </mc:Choice>
+    <mc:Fallback>
+      <p:transition spd="med">
+        <p:fade/>
+      </p:transition>
+    </mc:Fallback>
+  </mc:AlternateContent>
 </p:sld>
 </file>
 
@@ -12913,6 +15519,18 @@
   <p:clrMapOvr>
     <a:masterClrMapping/>
   </p:clrMapOvr>
+  <mc:AlternateContent xmlns:mc="http://schemas.openxmlformats.org/markup-compatibility/2006">
+    <mc:Choice xmlns:p14="http://schemas.microsoft.com/office/powerpoint/2010/main" Requires="p14">
+      <p:transition spd="med" p14:dur="700">
+        <p:fade/>
+      </p:transition>
+    </mc:Choice>
+    <mc:Fallback>
+      <p:transition spd="med">
+        <p:fade/>
+      </p:transition>
+    </mc:Fallback>
+  </mc:AlternateContent>
 </p:sld>
 </file>
 
@@ -13191,6 +15809,18 @@
   <p:clrMapOvr>
     <a:masterClrMapping/>
   </p:clrMapOvr>
+  <mc:AlternateContent xmlns:mc="http://schemas.openxmlformats.org/markup-compatibility/2006">
+    <mc:Choice xmlns:p14="http://schemas.microsoft.com/office/powerpoint/2010/main" Requires="p14">
+      <p:transition spd="med" p14:dur="700">
+        <p:fade/>
+      </p:transition>
+    </mc:Choice>
+    <mc:Fallback>
+      <p:transition spd="med">
+        <p:fade/>
+      </p:transition>
+    </mc:Fallback>
+  </mc:AlternateContent>
 </p:sld>
 </file>
 
@@ -13544,6 +16174,18 @@
   <p:clrMapOvr>
     <a:masterClrMapping/>
   </p:clrMapOvr>
+  <mc:AlternateContent xmlns:mc="http://schemas.openxmlformats.org/markup-compatibility/2006">
+    <mc:Choice xmlns:p14="http://schemas.microsoft.com/office/powerpoint/2010/main" Requires="p14">
+      <p:transition spd="med" p14:dur="700">
+        <p:fade/>
+      </p:transition>
+    </mc:Choice>
+    <mc:Fallback>
+      <p:transition spd="med">
+        <p:fade/>
+      </p:transition>
+    </mc:Fallback>
+  </mc:AlternateContent>
 </p:sld>
 </file>
 

</xml_diff>